<commit_message>
Add zero-copy and RDMA mentions
Signed-off-by: Dmitry Gladkov <dmitry.gladkov@intel.com>
</commit_message>
<xml_diff>
--- a/figures.pptx
+++ b/figures.pptx
@@ -111,6 +111,11 @@
       </a:defRPr>
     </a:lvl9pPr>
   </p:defaultTextStyle>
+  <p:extLst>
+    <p:ext uri="{EFAFB233-063F-42B5-8137-9DF3F51BA10A}">
+      <p15:sldGuideLst xmlns:p15="http://schemas.microsoft.com/office/powerpoint/2012/main"/>
+    </p:ext>
+  </p:extLst>
 </p:presentation>
 </file>
 
@@ -196,7 +201,7 @@
           <a:p>
             <a:fld id="{4349D774-6170-4873-8ACD-40DB67363980}" type="datetimeFigureOut">
               <a:rPr lang="ru-RU" smtClean="0"/>
-              <a:t>03.12.2017</a:t>
+              <a:t>26.12.2017</a:t>
             </a:fld>
             <a:endParaRPr lang="ru-RU"/>
           </a:p>
@@ -679,7 +684,7 @@
           <a:p>
             <a:fld id="{AA69D224-40D2-44AC-A010-8A9DDF5FAD53}" type="datetimeFigureOut">
               <a:rPr lang="ru-RU" smtClean="0"/>
-              <a:t>03.12.2017</a:t>
+              <a:t>26.12.2017</a:t>
             </a:fld>
             <a:endParaRPr lang="ru-RU"/>
           </a:p>
@@ -849,7 +854,7 @@
           <a:p>
             <a:fld id="{AA69D224-40D2-44AC-A010-8A9DDF5FAD53}" type="datetimeFigureOut">
               <a:rPr lang="ru-RU" smtClean="0"/>
-              <a:t>03.12.2017</a:t>
+              <a:t>26.12.2017</a:t>
             </a:fld>
             <a:endParaRPr lang="ru-RU"/>
           </a:p>
@@ -1029,7 +1034,7 @@
           <a:p>
             <a:fld id="{AA69D224-40D2-44AC-A010-8A9DDF5FAD53}" type="datetimeFigureOut">
               <a:rPr lang="ru-RU" smtClean="0"/>
-              <a:t>03.12.2017</a:t>
+              <a:t>26.12.2017</a:t>
             </a:fld>
             <a:endParaRPr lang="ru-RU"/>
           </a:p>
@@ -1199,7 +1204,7 @@
           <a:p>
             <a:fld id="{AA69D224-40D2-44AC-A010-8A9DDF5FAD53}" type="datetimeFigureOut">
               <a:rPr lang="ru-RU" smtClean="0"/>
-              <a:t>03.12.2017</a:t>
+              <a:t>26.12.2017</a:t>
             </a:fld>
             <a:endParaRPr lang="ru-RU"/>
           </a:p>
@@ -1445,7 +1450,7 @@
           <a:p>
             <a:fld id="{AA69D224-40D2-44AC-A010-8A9DDF5FAD53}" type="datetimeFigureOut">
               <a:rPr lang="ru-RU" smtClean="0"/>
-              <a:t>03.12.2017</a:t>
+              <a:t>26.12.2017</a:t>
             </a:fld>
             <a:endParaRPr lang="ru-RU"/>
           </a:p>
@@ -1677,7 +1682,7 @@
           <a:p>
             <a:fld id="{AA69D224-40D2-44AC-A010-8A9DDF5FAD53}" type="datetimeFigureOut">
               <a:rPr lang="ru-RU" smtClean="0"/>
-              <a:t>03.12.2017</a:t>
+              <a:t>26.12.2017</a:t>
             </a:fld>
             <a:endParaRPr lang="ru-RU"/>
           </a:p>
@@ -2044,7 +2049,7 @@
           <a:p>
             <a:fld id="{AA69D224-40D2-44AC-A010-8A9DDF5FAD53}" type="datetimeFigureOut">
               <a:rPr lang="ru-RU" smtClean="0"/>
-              <a:t>03.12.2017</a:t>
+              <a:t>26.12.2017</a:t>
             </a:fld>
             <a:endParaRPr lang="ru-RU"/>
           </a:p>
@@ -2162,7 +2167,7 @@
           <a:p>
             <a:fld id="{AA69D224-40D2-44AC-A010-8A9DDF5FAD53}" type="datetimeFigureOut">
               <a:rPr lang="ru-RU" smtClean="0"/>
-              <a:t>03.12.2017</a:t>
+              <a:t>26.12.2017</a:t>
             </a:fld>
             <a:endParaRPr lang="ru-RU"/>
           </a:p>
@@ -2257,7 +2262,7 @@
           <a:p>
             <a:fld id="{AA69D224-40D2-44AC-A010-8A9DDF5FAD53}" type="datetimeFigureOut">
               <a:rPr lang="ru-RU" smtClean="0"/>
-              <a:t>03.12.2017</a:t>
+              <a:t>26.12.2017</a:t>
             </a:fld>
             <a:endParaRPr lang="ru-RU"/>
           </a:p>
@@ -2534,7 +2539,7 @@
           <a:p>
             <a:fld id="{AA69D224-40D2-44AC-A010-8A9DDF5FAD53}" type="datetimeFigureOut">
               <a:rPr lang="ru-RU" smtClean="0"/>
-              <a:t>03.12.2017</a:t>
+              <a:t>26.12.2017</a:t>
             </a:fld>
             <a:endParaRPr lang="ru-RU"/>
           </a:p>
@@ -2787,7 +2792,7 @@
           <a:p>
             <a:fld id="{AA69D224-40D2-44AC-A010-8A9DDF5FAD53}" type="datetimeFigureOut">
               <a:rPr lang="ru-RU" smtClean="0"/>
-              <a:t>03.12.2017</a:t>
+              <a:t>26.12.2017</a:t>
             </a:fld>
             <a:endParaRPr lang="ru-RU"/>
           </a:p>
@@ -3000,7 +3005,7 @@
           <a:p>
             <a:fld id="{AA69D224-40D2-44AC-A010-8A9DDF5FAD53}" type="datetimeFigureOut">
               <a:rPr lang="ru-RU" smtClean="0"/>
-              <a:t>03.12.2017</a:t>
+              <a:t>26.12.2017</a:t>
             </a:fld>
             <a:endParaRPr lang="ru-RU"/>
           </a:p>
@@ -20260,6 +20265,879 @@
           <a:chExt cx="0" cy="0"/>
         </a:xfrm>
       </p:grpSpPr>
+      <p:grpSp>
+        <p:nvGrpSpPr>
+          <p:cNvPr id="35" name="Group 34"/>
+          <p:cNvGrpSpPr/>
+          <p:nvPr/>
+        </p:nvGrpSpPr>
+        <p:grpSpPr>
+          <a:xfrm>
+            <a:off x="1029765" y="1652954"/>
+            <a:ext cx="6654712" cy="4431323"/>
+            <a:chOff x="1029765" y="469558"/>
+            <a:chExt cx="7903220" cy="5614719"/>
+          </a:xfrm>
+        </p:grpSpPr>
+        <p:sp>
+          <p:nvSpPr>
+            <p:cNvPr id="34" name="Rectangle 33"/>
+            <p:cNvSpPr/>
+            <p:nvPr/>
+          </p:nvSpPr>
+          <p:spPr>
+            <a:xfrm>
+              <a:off x="1029765" y="469558"/>
+              <a:ext cx="7903220" cy="5614719"/>
+            </a:xfrm>
+            <a:prstGeom prst="rect">
+              <a:avLst/>
+            </a:prstGeom>
+          </p:spPr>
+          <p:style>
+            <a:lnRef idx="2">
+              <a:schemeClr val="dk1"/>
+            </a:lnRef>
+            <a:fillRef idx="1">
+              <a:schemeClr val="lt1"/>
+            </a:fillRef>
+            <a:effectRef idx="0">
+              <a:schemeClr val="dk1"/>
+            </a:effectRef>
+            <a:fontRef idx="minor">
+              <a:schemeClr val="dk1"/>
+            </a:fontRef>
+          </p:style>
+          <p:txBody>
+            <a:bodyPr rtlCol="0" anchor="ctr"/>
+            <a:lstStyle/>
+            <a:p>
+              <a:pPr algn="ctr"/>
+              <a:endParaRPr lang="ru-RU"/>
+            </a:p>
+          </p:txBody>
+        </p:sp>
+        <p:cxnSp>
+          <p:nvCxnSpPr>
+            <p:cNvPr id="3" name="Straight Connector 2"/>
+            <p:cNvCxnSpPr/>
+            <p:nvPr/>
+          </p:nvCxnSpPr>
+          <p:spPr>
+            <a:xfrm>
+              <a:off x="1925515" y="1116623"/>
+              <a:ext cx="8793" cy="4633546"/>
+            </a:xfrm>
+            <a:prstGeom prst="line">
+              <a:avLst/>
+            </a:prstGeom>
+            <a:ln w="19050">
+              <a:solidFill>
+                <a:schemeClr val="tx1"/>
+              </a:solidFill>
+            </a:ln>
+          </p:spPr>
+          <p:style>
+            <a:lnRef idx="1">
+              <a:schemeClr val="accent1"/>
+            </a:lnRef>
+            <a:fillRef idx="0">
+              <a:schemeClr val="accent1"/>
+            </a:fillRef>
+            <a:effectRef idx="0">
+              <a:schemeClr val="accent1"/>
+            </a:effectRef>
+            <a:fontRef idx="minor">
+              <a:schemeClr val="tx1"/>
+            </a:fontRef>
+          </p:style>
+        </p:cxnSp>
+        <p:cxnSp>
+          <p:nvCxnSpPr>
+            <p:cNvPr id="4" name="Straight Connector 3"/>
+            <p:cNvCxnSpPr/>
+            <p:nvPr/>
+          </p:nvCxnSpPr>
+          <p:spPr>
+            <a:xfrm>
+              <a:off x="3809999" y="1116623"/>
+              <a:ext cx="8793" cy="4633546"/>
+            </a:xfrm>
+            <a:prstGeom prst="line">
+              <a:avLst/>
+            </a:prstGeom>
+            <a:ln w="19050">
+              <a:solidFill>
+                <a:schemeClr val="tx1"/>
+              </a:solidFill>
+            </a:ln>
+          </p:spPr>
+          <p:style>
+            <a:lnRef idx="1">
+              <a:schemeClr val="accent1"/>
+            </a:lnRef>
+            <a:fillRef idx="0">
+              <a:schemeClr val="accent1"/>
+            </a:fillRef>
+            <a:effectRef idx="0">
+              <a:schemeClr val="accent1"/>
+            </a:effectRef>
+            <a:fontRef idx="minor">
+              <a:schemeClr val="tx1"/>
+            </a:fontRef>
+          </p:style>
+        </p:cxnSp>
+        <p:cxnSp>
+          <p:nvCxnSpPr>
+            <p:cNvPr id="5" name="Straight Connector 4"/>
+            <p:cNvCxnSpPr/>
+            <p:nvPr/>
+          </p:nvCxnSpPr>
+          <p:spPr>
+            <a:xfrm>
+              <a:off x="6063924" y="1150382"/>
+              <a:ext cx="8793" cy="4633546"/>
+            </a:xfrm>
+            <a:prstGeom prst="line">
+              <a:avLst/>
+            </a:prstGeom>
+            <a:ln w="19050">
+              <a:solidFill>
+                <a:schemeClr val="tx1"/>
+              </a:solidFill>
+            </a:ln>
+          </p:spPr>
+          <p:style>
+            <a:lnRef idx="1">
+              <a:schemeClr val="accent1"/>
+            </a:lnRef>
+            <a:fillRef idx="0">
+              <a:schemeClr val="accent1"/>
+            </a:fillRef>
+            <a:effectRef idx="0">
+              <a:schemeClr val="accent1"/>
+            </a:effectRef>
+            <a:fontRef idx="minor">
+              <a:schemeClr val="tx1"/>
+            </a:fontRef>
+          </p:style>
+        </p:cxnSp>
+        <p:cxnSp>
+          <p:nvCxnSpPr>
+            <p:cNvPr id="6" name="Straight Connector 5"/>
+            <p:cNvCxnSpPr/>
+            <p:nvPr/>
+          </p:nvCxnSpPr>
+          <p:spPr>
+            <a:xfrm>
+              <a:off x="7948408" y="1150382"/>
+              <a:ext cx="8793" cy="4633546"/>
+            </a:xfrm>
+            <a:prstGeom prst="line">
+              <a:avLst/>
+            </a:prstGeom>
+            <a:ln w="19050">
+              <a:solidFill>
+                <a:schemeClr val="tx1"/>
+              </a:solidFill>
+            </a:ln>
+          </p:spPr>
+          <p:style>
+            <a:lnRef idx="1">
+              <a:schemeClr val="accent1"/>
+            </a:lnRef>
+            <a:fillRef idx="0">
+              <a:schemeClr val="accent1"/>
+            </a:fillRef>
+            <a:effectRef idx="0">
+              <a:schemeClr val="accent1"/>
+            </a:effectRef>
+            <a:fontRef idx="minor">
+              <a:schemeClr val="tx1"/>
+            </a:fontRef>
+          </p:style>
+        </p:cxnSp>
+        <p:cxnSp>
+          <p:nvCxnSpPr>
+            <p:cNvPr id="8" name="Straight Arrow Connector 7"/>
+            <p:cNvCxnSpPr/>
+            <p:nvPr/>
+          </p:nvCxnSpPr>
+          <p:spPr>
+            <a:xfrm>
+              <a:off x="6063924" y="1440529"/>
+              <a:ext cx="1884484" cy="993530"/>
+            </a:xfrm>
+            <a:prstGeom prst="straightConnector1">
+              <a:avLst/>
+            </a:prstGeom>
+            <a:ln>
+              <a:solidFill>
+                <a:schemeClr val="tx1"/>
+              </a:solidFill>
+              <a:prstDash val="dash"/>
+              <a:tailEnd type="triangle"/>
+            </a:ln>
+          </p:spPr>
+          <p:style>
+            <a:lnRef idx="1">
+              <a:schemeClr val="accent1"/>
+            </a:lnRef>
+            <a:fillRef idx="0">
+              <a:schemeClr val="accent1"/>
+            </a:fillRef>
+            <a:effectRef idx="0">
+              <a:schemeClr val="accent1"/>
+            </a:effectRef>
+            <a:fontRef idx="minor">
+              <a:schemeClr val="tx1"/>
+            </a:fontRef>
+          </p:style>
+        </p:cxnSp>
+        <p:cxnSp>
+          <p:nvCxnSpPr>
+            <p:cNvPr id="11" name="Straight Arrow Connector 10"/>
+            <p:cNvCxnSpPr/>
+            <p:nvPr/>
+          </p:nvCxnSpPr>
+          <p:spPr>
+            <a:xfrm flipH="1">
+              <a:off x="6063924" y="2618698"/>
+              <a:ext cx="1884484" cy="993530"/>
+            </a:xfrm>
+            <a:prstGeom prst="straightConnector1">
+              <a:avLst/>
+            </a:prstGeom>
+            <a:ln>
+              <a:solidFill>
+                <a:schemeClr val="tx1"/>
+              </a:solidFill>
+              <a:prstDash val="dash"/>
+              <a:tailEnd type="triangle"/>
+            </a:ln>
+          </p:spPr>
+          <p:style>
+            <a:lnRef idx="1">
+              <a:schemeClr val="accent1"/>
+            </a:lnRef>
+            <a:fillRef idx="0">
+              <a:schemeClr val="accent1"/>
+            </a:fillRef>
+            <a:effectRef idx="0">
+              <a:schemeClr val="accent1"/>
+            </a:effectRef>
+            <a:fontRef idx="minor">
+              <a:schemeClr val="tx1"/>
+            </a:fontRef>
+          </p:style>
+        </p:cxnSp>
+        <p:cxnSp>
+          <p:nvCxnSpPr>
+            <p:cNvPr id="12" name="Straight Arrow Connector 11"/>
+            <p:cNvCxnSpPr/>
+            <p:nvPr/>
+          </p:nvCxnSpPr>
+          <p:spPr>
+            <a:xfrm>
+              <a:off x="6081510" y="4780143"/>
+              <a:ext cx="1884484" cy="993530"/>
+            </a:xfrm>
+            <a:prstGeom prst="straightConnector1">
+              <a:avLst/>
+            </a:prstGeom>
+            <a:ln>
+              <a:solidFill>
+                <a:schemeClr val="tx1"/>
+              </a:solidFill>
+              <a:prstDash val="dash"/>
+              <a:tailEnd type="triangle"/>
+            </a:ln>
+          </p:spPr>
+          <p:style>
+            <a:lnRef idx="1">
+              <a:schemeClr val="accent1"/>
+            </a:lnRef>
+            <a:fillRef idx="0">
+              <a:schemeClr val="accent1"/>
+            </a:fillRef>
+            <a:effectRef idx="0">
+              <a:schemeClr val="accent1"/>
+            </a:effectRef>
+            <a:fontRef idx="minor">
+              <a:schemeClr val="tx1"/>
+            </a:fontRef>
+          </p:style>
+        </p:cxnSp>
+        <p:cxnSp>
+          <p:nvCxnSpPr>
+            <p:cNvPr id="13" name="Straight Arrow Connector 12"/>
+            <p:cNvCxnSpPr/>
+            <p:nvPr/>
+          </p:nvCxnSpPr>
+          <p:spPr>
+            <a:xfrm>
+              <a:off x="6063924" y="3704548"/>
+              <a:ext cx="1884484" cy="993530"/>
+            </a:xfrm>
+            <a:prstGeom prst="straightConnector1">
+              <a:avLst/>
+            </a:prstGeom>
+            <a:ln>
+              <a:solidFill>
+                <a:schemeClr val="tx1"/>
+              </a:solidFill>
+              <a:prstDash val="solid"/>
+              <a:tailEnd type="triangle"/>
+            </a:ln>
+          </p:spPr>
+          <p:style>
+            <a:lnRef idx="1">
+              <a:schemeClr val="accent1"/>
+            </a:lnRef>
+            <a:fillRef idx="0">
+              <a:schemeClr val="accent1"/>
+            </a:fillRef>
+            <a:effectRef idx="0">
+              <a:schemeClr val="accent1"/>
+            </a:effectRef>
+            <a:fontRef idx="minor">
+              <a:schemeClr val="tx1"/>
+            </a:fontRef>
+          </p:style>
+        </p:cxnSp>
+        <p:cxnSp>
+          <p:nvCxnSpPr>
+            <p:cNvPr id="14" name="Straight Arrow Connector 13"/>
+            <p:cNvCxnSpPr/>
+            <p:nvPr/>
+          </p:nvCxnSpPr>
+          <p:spPr>
+            <a:xfrm>
+              <a:off x="1925515" y="2400300"/>
+              <a:ext cx="1884484" cy="993530"/>
+            </a:xfrm>
+            <a:prstGeom prst="straightConnector1">
+              <a:avLst/>
+            </a:prstGeom>
+            <a:ln>
+              <a:solidFill>
+                <a:schemeClr val="tx1"/>
+              </a:solidFill>
+              <a:prstDash val="solid"/>
+              <a:tailEnd type="triangle"/>
+            </a:ln>
+          </p:spPr>
+          <p:style>
+            <a:lnRef idx="1">
+              <a:schemeClr val="accent1"/>
+            </a:lnRef>
+            <a:fillRef idx="0">
+              <a:schemeClr val="accent1"/>
+            </a:fillRef>
+            <a:effectRef idx="0">
+              <a:schemeClr val="accent1"/>
+            </a:effectRef>
+            <a:fontRef idx="minor">
+              <a:schemeClr val="tx1"/>
+            </a:fontRef>
+          </p:style>
+        </p:cxnSp>
+        <p:sp>
+          <p:nvSpPr>
+            <p:cNvPr id="15" name="TextBox 14"/>
+            <p:cNvSpPr txBox="1"/>
+            <p:nvPr/>
+          </p:nvSpPr>
+          <p:spPr>
+            <a:xfrm>
+              <a:off x="2094564" y="668215"/>
+              <a:ext cx="1543179" cy="369332"/>
+            </a:xfrm>
+            <a:prstGeom prst="rect">
+              <a:avLst/>
+            </a:prstGeom>
+            <a:noFill/>
+          </p:spPr>
+          <p:txBody>
+            <a:bodyPr wrap="none" rtlCol="0">
+              <a:spAutoFit/>
+            </a:bodyPr>
+            <a:lstStyle/>
+            <a:p>
+              <a:r>
+                <a:rPr lang="en-US" dirty="0" smtClean="0"/>
+                <a:t>Eager Protocol</a:t>
+              </a:r>
+              <a:endParaRPr lang="ru-RU" dirty="0"/>
+            </a:p>
+          </p:txBody>
+        </p:sp>
+        <p:sp>
+          <p:nvSpPr>
+            <p:cNvPr id="16" name="TextBox 15"/>
+            <p:cNvSpPr txBox="1"/>
+            <p:nvPr/>
+          </p:nvSpPr>
+          <p:spPr>
+            <a:xfrm>
+              <a:off x="5953939" y="668215"/>
+              <a:ext cx="2139625" cy="369332"/>
+            </a:xfrm>
+            <a:prstGeom prst="rect">
+              <a:avLst/>
+            </a:prstGeom>
+            <a:noFill/>
+          </p:spPr>
+          <p:txBody>
+            <a:bodyPr wrap="none" rtlCol="0">
+              <a:spAutoFit/>
+            </a:bodyPr>
+            <a:lstStyle/>
+            <a:p>
+              <a:r>
+                <a:rPr lang="en-US" dirty="0" smtClean="0"/>
+                <a:t>Rendezvous Protocol</a:t>
+              </a:r>
+              <a:endParaRPr lang="ru-RU" dirty="0"/>
+            </a:p>
+          </p:txBody>
+        </p:sp>
+        <p:sp>
+          <p:nvSpPr>
+            <p:cNvPr id="17" name="TextBox 16"/>
+            <p:cNvSpPr txBox="1"/>
+            <p:nvPr/>
+          </p:nvSpPr>
+          <p:spPr>
+            <a:xfrm>
+              <a:off x="1302357" y="2030967"/>
+              <a:ext cx="708575" cy="428966"/>
+            </a:xfrm>
+            <a:prstGeom prst="rect">
+              <a:avLst/>
+            </a:prstGeom>
+            <a:noFill/>
+          </p:spPr>
+          <p:txBody>
+            <a:bodyPr wrap="none" rtlCol="0">
+              <a:spAutoFit/>
+            </a:bodyPr>
+            <a:lstStyle/>
+            <a:p>
+              <a:r>
+                <a:rPr lang="en-US" sz="1600" dirty="0" smtClean="0"/>
+                <a:t>Send</a:t>
+              </a:r>
+              <a:endParaRPr lang="ru-RU" dirty="0"/>
+            </a:p>
+          </p:txBody>
+        </p:sp>
+        <p:sp>
+          <p:nvSpPr>
+            <p:cNvPr id="18" name="TextBox 17"/>
+            <p:cNvSpPr txBox="1"/>
+            <p:nvPr/>
+          </p:nvSpPr>
+          <p:spPr>
+            <a:xfrm>
+              <a:off x="3809999" y="3982887"/>
+              <a:ext cx="979897" cy="428966"/>
+            </a:xfrm>
+            <a:prstGeom prst="rect">
+              <a:avLst/>
+            </a:prstGeom>
+            <a:noFill/>
+          </p:spPr>
+          <p:txBody>
+            <a:bodyPr wrap="none" rtlCol="0">
+              <a:spAutoFit/>
+            </a:bodyPr>
+            <a:lstStyle/>
+            <a:p>
+              <a:r>
+                <a:rPr lang="en-US" sz="1600" dirty="0" smtClean="0"/>
+                <a:t>Receive</a:t>
+              </a:r>
+              <a:endParaRPr lang="ru-RU" dirty="0"/>
+            </a:p>
+          </p:txBody>
+        </p:sp>
+        <p:sp>
+          <p:nvSpPr>
+            <p:cNvPr id="19" name="TextBox 18"/>
+            <p:cNvSpPr txBox="1"/>
+            <p:nvPr/>
+          </p:nvSpPr>
+          <p:spPr>
+            <a:xfrm>
+              <a:off x="5431973" y="1119612"/>
+              <a:ext cx="708575" cy="428966"/>
+            </a:xfrm>
+            <a:prstGeom prst="rect">
+              <a:avLst/>
+            </a:prstGeom>
+            <a:noFill/>
+          </p:spPr>
+          <p:txBody>
+            <a:bodyPr wrap="none" rtlCol="0">
+              <a:spAutoFit/>
+            </a:bodyPr>
+            <a:lstStyle/>
+            <a:p>
+              <a:r>
+                <a:rPr lang="en-US" sz="1600" dirty="0" smtClean="0"/>
+                <a:t>Send</a:t>
+              </a:r>
+              <a:endParaRPr lang="ru-RU" dirty="0"/>
+            </a:p>
+          </p:txBody>
+        </p:sp>
+        <p:sp>
+          <p:nvSpPr>
+            <p:cNvPr id="20" name="TextBox 19"/>
+            <p:cNvSpPr txBox="1"/>
+            <p:nvPr/>
+          </p:nvSpPr>
+          <p:spPr>
+            <a:xfrm>
+              <a:off x="7930822" y="2249393"/>
+              <a:ext cx="979897" cy="428966"/>
+            </a:xfrm>
+            <a:prstGeom prst="rect">
+              <a:avLst/>
+            </a:prstGeom>
+            <a:noFill/>
+          </p:spPr>
+          <p:txBody>
+            <a:bodyPr wrap="none" rtlCol="0">
+              <a:spAutoFit/>
+            </a:bodyPr>
+            <a:lstStyle/>
+            <a:p>
+              <a:r>
+                <a:rPr lang="en-US" sz="1600" dirty="0" smtClean="0"/>
+                <a:t>Receive</a:t>
+              </a:r>
+              <a:endParaRPr lang="ru-RU" dirty="0"/>
+            </a:p>
+          </p:txBody>
+        </p:sp>
+        <p:cxnSp>
+          <p:nvCxnSpPr>
+            <p:cNvPr id="22" name="Straight Connector 21"/>
+            <p:cNvCxnSpPr/>
+            <p:nvPr/>
+          </p:nvCxnSpPr>
+          <p:spPr>
+            <a:xfrm flipV="1">
+              <a:off x="1088927" y="2400299"/>
+              <a:ext cx="811307" cy="1"/>
+            </a:xfrm>
+            <a:prstGeom prst="line">
+              <a:avLst/>
+            </a:prstGeom>
+            <a:ln w="9525">
+              <a:solidFill>
+                <a:schemeClr val="tx1"/>
+              </a:solidFill>
+              <a:prstDash val="lgDashDotDot"/>
+            </a:ln>
+          </p:spPr>
+          <p:style>
+            <a:lnRef idx="1">
+              <a:schemeClr val="accent1"/>
+            </a:lnRef>
+            <a:fillRef idx="0">
+              <a:schemeClr val="accent1"/>
+            </a:fillRef>
+            <a:effectRef idx="0">
+              <a:schemeClr val="accent1"/>
+            </a:effectRef>
+            <a:fontRef idx="minor">
+              <a:schemeClr val="tx1"/>
+            </a:fontRef>
+          </p:style>
+        </p:cxnSp>
+        <p:cxnSp>
+          <p:nvCxnSpPr>
+            <p:cNvPr id="25" name="Straight Connector 24"/>
+            <p:cNvCxnSpPr/>
+            <p:nvPr/>
+          </p:nvCxnSpPr>
+          <p:spPr>
+            <a:xfrm flipV="1">
+              <a:off x="3852094" y="4352219"/>
+              <a:ext cx="811307" cy="1"/>
+            </a:xfrm>
+            <a:prstGeom prst="line">
+              <a:avLst/>
+            </a:prstGeom>
+            <a:ln w="9525">
+              <a:solidFill>
+                <a:schemeClr val="tx1"/>
+              </a:solidFill>
+              <a:prstDash val="lgDashDotDot"/>
+            </a:ln>
+          </p:spPr>
+          <p:style>
+            <a:lnRef idx="1">
+              <a:schemeClr val="accent1"/>
+            </a:lnRef>
+            <a:fillRef idx="0">
+              <a:schemeClr val="accent1"/>
+            </a:fillRef>
+            <a:effectRef idx="0">
+              <a:schemeClr val="accent1"/>
+            </a:effectRef>
+            <a:fontRef idx="minor">
+              <a:schemeClr val="tx1"/>
+            </a:fontRef>
+          </p:style>
+        </p:cxnSp>
+        <p:cxnSp>
+          <p:nvCxnSpPr>
+            <p:cNvPr id="26" name="Straight Connector 25"/>
+            <p:cNvCxnSpPr/>
+            <p:nvPr/>
+          </p:nvCxnSpPr>
+          <p:spPr>
+            <a:xfrm flipV="1">
+              <a:off x="5252617" y="1440528"/>
+              <a:ext cx="811307" cy="1"/>
+            </a:xfrm>
+            <a:prstGeom prst="line">
+              <a:avLst/>
+            </a:prstGeom>
+            <a:ln w="9525">
+              <a:solidFill>
+                <a:schemeClr val="tx1"/>
+              </a:solidFill>
+              <a:prstDash val="lgDashDotDot"/>
+            </a:ln>
+          </p:spPr>
+          <p:style>
+            <a:lnRef idx="1">
+              <a:schemeClr val="accent1"/>
+            </a:lnRef>
+            <a:fillRef idx="0">
+              <a:schemeClr val="accent1"/>
+            </a:fillRef>
+            <a:effectRef idx="0">
+              <a:schemeClr val="accent1"/>
+            </a:effectRef>
+            <a:fontRef idx="minor">
+              <a:schemeClr val="tx1"/>
+            </a:fontRef>
+          </p:style>
+        </p:cxnSp>
+        <p:cxnSp>
+          <p:nvCxnSpPr>
+            <p:cNvPr id="28" name="Straight Connector 27"/>
+            <p:cNvCxnSpPr/>
+            <p:nvPr/>
+          </p:nvCxnSpPr>
+          <p:spPr>
+            <a:xfrm flipV="1">
+              <a:off x="8005642" y="2618697"/>
+              <a:ext cx="811307" cy="1"/>
+            </a:xfrm>
+            <a:prstGeom prst="line">
+              <a:avLst/>
+            </a:prstGeom>
+            <a:ln w="9525">
+              <a:solidFill>
+                <a:schemeClr val="tx1"/>
+              </a:solidFill>
+              <a:prstDash val="lgDashDotDot"/>
+            </a:ln>
+          </p:spPr>
+          <p:style>
+            <a:lnRef idx="1">
+              <a:schemeClr val="accent1"/>
+            </a:lnRef>
+            <a:fillRef idx="0">
+              <a:schemeClr val="accent1"/>
+            </a:fillRef>
+            <a:effectRef idx="0">
+              <a:schemeClr val="accent1"/>
+            </a:effectRef>
+            <a:fontRef idx="minor">
+              <a:schemeClr val="tx1"/>
+            </a:fontRef>
+          </p:style>
+        </p:cxnSp>
+        <p:sp>
+          <p:nvSpPr>
+            <p:cNvPr id="29" name="TextBox 28"/>
+            <p:cNvSpPr txBox="1"/>
+            <p:nvPr/>
+          </p:nvSpPr>
+          <p:spPr>
+            <a:xfrm rot="1619635">
+              <a:off x="2364516" y="2593345"/>
+              <a:ext cx="1018048" cy="350972"/>
+            </a:xfrm>
+            <a:prstGeom prst="rect">
+              <a:avLst/>
+            </a:prstGeom>
+            <a:noFill/>
+          </p:spPr>
+          <p:txBody>
+            <a:bodyPr wrap="none" rtlCol="0">
+              <a:spAutoFit/>
+            </a:bodyPr>
+            <a:lstStyle/>
+            <a:p>
+              <a:r>
+                <a:rPr lang="en-US" sz="1200" dirty="0" smtClean="0"/>
+                <a:t>Eager Data</a:t>
+              </a:r>
+              <a:endParaRPr lang="ru-RU" sz="1600" dirty="0"/>
+            </a:p>
+          </p:txBody>
+        </p:sp>
+        <p:sp>
+          <p:nvSpPr>
+            <p:cNvPr id="30" name="TextBox 29"/>
+            <p:cNvSpPr txBox="1"/>
+            <p:nvPr/>
+          </p:nvSpPr>
+          <p:spPr>
+            <a:xfrm rot="1582072">
+              <a:off x="6519225" y="1412393"/>
+              <a:ext cx="1102040" cy="584954"/>
+            </a:xfrm>
+            <a:prstGeom prst="rect">
+              <a:avLst/>
+            </a:prstGeom>
+            <a:noFill/>
+          </p:spPr>
+          <p:txBody>
+            <a:bodyPr wrap="none" rtlCol="0">
+              <a:spAutoFit/>
+            </a:bodyPr>
+            <a:lstStyle/>
+            <a:p>
+              <a:r>
+                <a:rPr lang="en-US" sz="1200" dirty="0" smtClean="0"/>
+                <a:t>Rendezvous</a:t>
+              </a:r>
+            </a:p>
+            <a:p>
+              <a:pPr algn="ctr"/>
+              <a:r>
+                <a:rPr lang="en-US" sz="1200" dirty="0" smtClean="0"/>
+                <a:t>Start</a:t>
+              </a:r>
+              <a:endParaRPr lang="ru-RU" sz="1200" dirty="0"/>
+            </a:p>
+          </p:txBody>
+        </p:sp>
+        <p:sp>
+          <p:nvSpPr>
+            <p:cNvPr id="31" name="TextBox 30"/>
+            <p:cNvSpPr txBox="1"/>
+            <p:nvPr/>
+          </p:nvSpPr>
+          <p:spPr>
+            <a:xfrm rot="19917757">
+              <a:off x="6472731" y="2552453"/>
+              <a:ext cx="1102040" cy="584954"/>
+            </a:xfrm>
+            <a:prstGeom prst="rect">
+              <a:avLst/>
+            </a:prstGeom>
+            <a:noFill/>
+          </p:spPr>
+          <p:txBody>
+            <a:bodyPr wrap="none" rtlCol="0">
+              <a:spAutoFit/>
+            </a:bodyPr>
+            <a:lstStyle/>
+            <a:p>
+              <a:r>
+                <a:rPr lang="en-US" sz="1200" dirty="0" smtClean="0"/>
+                <a:t>Rendezvous</a:t>
+              </a:r>
+            </a:p>
+            <a:p>
+              <a:pPr algn="ctr"/>
+              <a:r>
+                <a:rPr lang="en-US" sz="1200" dirty="0" smtClean="0"/>
+                <a:t>Reply</a:t>
+              </a:r>
+              <a:endParaRPr lang="ru-RU" sz="1200" dirty="0"/>
+            </a:p>
+          </p:txBody>
+        </p:sp>
+        <p:sp>
+          <p:nvSpPr>
+            <p:cNvPr id="32" name="TextBox 31"/>
+            <p:cNvSpPr txBox="1"/>
+            <p:nvPr/>
+          </p:nvSpPr>
+          <p:spPr>
+            <a:xfrm rot="1621010">
+              <a:off x="6326034" y="3918110"/>
+              <a:ext cx="1488425" cy="350972"/>
+            </a:xfrm>
+            <a:prstGeom prst="rect">
+              <a:avLst/>
+            </a:prstGeom>
+            <a:noFill/>
+          </p:spPr>
+          <p:txBody>
+            <a:bodyPr wrap="none" rtlCol="0">
+              <a:spAutoFit/>
+            </a:bodyPr>
+            <a:lstStyle/>
+            <a:p>
+              <a:r>
+                <a:rPr lang="en-US" sz="1200" dirty="0" smtClean="0"/>
+                <a:t>Rendezvous Data</a:t>
+              </a:r>
+              <a:endParaRPr lang="ru-RU" sz="1600" dirty="0"/>
+            </a:p>
+          </p:txBody>
+        </p:sp>
+        <p:sp>
+          <p:nvSpPr>
+            <p:cNvPr id="33" name="TextBox 32"/>
+            <p:cNvSpPr txBox="1"/>
+            <p:nvPr/>
+          </p:nvSpPr>
+          <p:spPr>
+            <a:xfrm rot="1658368">
+              <a:off x="6459542" y="4708893"/>
+              <a:ext cx="1102040" cy="584954"/>
+            </a:xfrm>
+            <a:prstGeom prst="rect">
+              <a:avLst/>
+            </a:prstGeom>
+            <a:noFill/>
+          </p:spPr>
+          <p:txBody>
+            <a:bodyPr wrap="none" rtlCol="0">
+              <a:spAutoFit/>
+            </a:bodyPr>
+            <a:lstStyle/>
+            <a:p>
+              <a:r>
+                <a:rPr lang="en-US" sz="1200" dirty="0" smtClean="0"/>
+                <a:t>Rendezvous</a:t>
+              </a:r>
+            </a:p>
+            <a:p>
+              <a:pPr algn="ctr"/>
+              <a:r>
+                <a:rPr lang="en-US" sz="1200" dirty="0" smtClean="0"/>
+                <a:t>Finish</a:t>
+              </a:r>
+              <a:endParaRPr lang="ru-RU" sz="1200" dirty="0"/>
+            </a:p>
+          </p:txBody>
+        </p:sp>
+      </p:grpSp>
     </p:spTree>
     <p:extLst>
       <p:ext uri="{BB962C8B-B14F-4D97-AF65-F5344CB8AC3E}">

</xml_diff>

<commit_message>
Add Link Layer of OPA
Signed-off-by: Dmitry Gladkov <dmitry.gladkov@intel.com>
</commit_message>
<xml_diff>
--- a/figures.pptx
+++ b/figures.pptx
@@ -5,7 +5,7 @@
     <p:sldMasterId id="2147483648" r:id="rId1"/>
   </p:sldMasterIdLst>
   <p:notesMasterIdLst>
-    <p:notesMasterId r:id="rId7"/>
+    <p:notesMasterId r:id="rId8"/>
   </p:notesMasterIdLst>
   <p:sldIdLst>
     <p:sldId id="256" r:id="rId2"/>
@@ -13,6 +13,7 @@
     <p:sldId id="258" r:id="rId4"/>
     <p:sldId id="259" r:id="rId5"/>
     <p:sldId id="260" r:id="rId6"/>
+    <p:sldId id="261" r:id="rId7"/>
   </p:sldIdLst>
   <p:sldSz cx="12192000" cy="6858000"/>
   <p:notesSz cx="6858000" cy="9144000"/>
@@ -201,7 +202,7 @@
           <a:p>
             <a:fld id="{4349D774-6170-4873-8ACD-40DB67363980}" type="datetimeFigureOut">
               <a:rPr lang="ru-RU" smtClean="0"/>
-              <a:t>26.12.2017</a:t>
+              <a:t>10.03.2018</a:t>
             </a:fld>
             <a:endParaRPr lang="ru-RU"/>
           </a:p>
@@ -553,6 +554,90 @@
 </p:notes>
 </file>
 
+<file path=ppt/notesSlides/notesSlide2.xml><?xml version="1.0" encoding="utf-8"?>
+<p:notes xmlns:a="http://schemas.openxmlformats.org/drawingml/2006/main" xmlns:r="http://schemas.openxmlformats.org/officeDocument/2006/relationships" xmlns:p="http://schemas.openxmlformats.org/presentationml/2006/main">
+  <p:cSld>
+    <p:spTree>
+      <p:nvGrpSpPr>
+        <p:cNvPr id="1" name=""/>
+        <p:cNvGrpSpPr/>
+        <p:nvPr/>
+      </p:nvGrpSpPr>
+      <p:grpSpPr>
+        <a:xfrm>
+          <a:off x="0" y="0"/>
+          <a:ext cx="0" cy="0"/>
+          <a:chOff x="0" y="0"/>
+          <a:chExt cx="0" cy="0"/>
+        </a:xfrm>
+      </p:grpSpPr>
+      <p:sp>
+        <p:nvSpPr>
+          <p:cNvPr id="2" name="Slide Image Placeholder 1"/>
+          <p:cNvSpPr>
+            <a:spLocks noGrp="1" noRot="1" noChangeAspect="1"/>
+          </p:cNvSpPr>
+          <p:nvPr>
+            <p:ph type="sldImg"/>
+          </p:nvPr>
+        </p:nvSpPr>
+        <p:spPr/>
+      </p:sp>
+      <p:sp>
+        <p:nvSpPr>
+          <p:cNvPr id="3" name="Notes Placeholder 2"/>
+          <p:cNvSpPr>
+            <a:spLocks noGrp="1"/>
+          </p:cNvSpPr>
+          <p:nvPr>
+            <p:ph type="body" idx="1"/>
+          </p:nvPr>
+        </p:nvSpPr>
+        <p:spPr/>
+        <p:txBody>
+          <a:bodyPr/>
+          <a:lstStyle/>
+          <a:p>
+            <a:endParaRPr lang="ru-RU"/>
+          </a:p>
+        </p:txBody>
+      </p:sp>
+      <p:sp>
+        <p:nvSpPr>
+          <p:cNvPr id="4" name="Slide Number Placeholder 3"/>
+          <p:cNvSpPr>
+            <a:spLocks noGrp="1"/>
+          </p:cNvSpPr>
+          <p:nvPr>
+            <p:ph type="sldNum" sz="quarter" idx="10"/>
+          </p:nvPr>
+        </p:nvSpPr>
+        <p:spPr/>
+        <p:txBody>
+          <a:bodyPr/>
+          <a:lstStyle/>
+          <a:p>
+            <a:fld id="{96089C46-9B0D-4A2C-B7CE-327559E7AB61}" type="slidenum">
+              <a:rPr lang="ru-RU" smtClean="0"/>
+              <a:t>6</a:t>
+            </a:fld>
+            <a:endParaRPr lang="ru-RU"/>
+          </a:p>
+        </p:txBody>
+      </p:sp>
+    </p:spTree>
+    <p:extLst>
+      <p:ext uri="{BB962C8B-B14F-4D97-AF65-F5344CB8AC3E}">
+        <p14:creationId xmlns:p14="http://schemas.microsoft.com/office/powerpoint/2010/main" val="1692787743"/>
+      </p:ext>
+    </p:extLst>
+  </p:cSld>
+  <p:clrMapOvr>
+    <a:masterClrMapping/>
+  </p:clrMapOvr>
+</p:notes>
+</file>
+
 <file path=ppt/slideLayouts/slideLayout1.xml><?xml version="1.0" encoding="utf-8"?>
 <p:sldLayout xmlns:a="http://schemas.openxmlformats.org/drawingml/2006/main" xmlns:r="http://schemas.openxmlformats.org/officeDocument/2006/relationships" xmlns:p="http://schemas.openxmlformats.org/presentationml/2006/main" type="title" preserve="1">
   <p:cSld name="Title Slide">
@@ -684,7 +769,7 @@
           <a:p>
             <a:fld id="{AA69D224-40D2-44AC-A010-8A9DDF5FAD53}" type="datetimeFigureOut">
               <a:rPr lang="ru-RU" smtClean="0"/>
-              <a:t>26.12.2017</a:t>
+              <a:t>10.03.2018</a:t>
             </a:fld>
             <a:endParaRPr lang="ru-RU"/>
           </a:p>
@@ -854,7 +939,7 @@
           <a:p>
             <a:fld id="{AA69D224-40D2-44AC-A010-8A9DDF5FAD53}" type="datetimeFigureOut">
               <a:rPr lang="ru-RU" smtClean="0"/>
-              <a:t>26.12.2017</a:t>
+              <a:t>10.03.2018</a:t>
             </a:fld>
             <a:endParaRPr lang="ru-RU"/>
           </a:p>
@@ -1034,7 +1119,7 @@
           <a:p>
             <a:fld id="{AA69D224-40D2-44AC-A010-8A9DDF5FAD53}" type="datetimeFigureOut">
               <a:rPr lang="ru-RU" smtClean="0"/>
-              <a:t>26.12.2017</a:t>
+              <a:t>10.03.2018</a:t>
             </a:fld>
             <a:endParaRPr lang="ru-RU"/>
           </a:p>
@@ -1204,7 +1289,7 @@
           <a:p>
             <a:fld id="{AA69D224-40D2-44AC-A010-8A9DDF5FAD53}" type="datetimeFigureOut">
               <a:rPr lang="ru-RU" smtClean="0"/>
-              <a:t>26.12.2017</a:t>
+              <a:t>10.03.2018</a:t>
             </a:fld>
             <a:endParaRPr lang="ru-RU"/>
           </a:p>
@@ -1450,7 +1535,7 @@
           <a:p>
             <a:fld id="{AA69D224-40D2-44AC-A010-8A9DDF5FAD53}" type="datetimeFigureOut">
               <a:rPr lang="ru-RU" smtClean="0"/>
-              <a:t>26.12.2017</a:t>
+              <a:t>10.03.2018</a:t>
             </a:fld>
             <a:endParaRPr lang="ru-RU"/>
           </a:p>
@@ -1682,7 +1767,7 @@
           <a:p>
             <a:fld id="{AA69D224-40D2-44AC-A010-8A9DDF5FAD53}" type="datetimeFigureOut">
               <a:rPr lang="ru-RU" smtClean="0"/>
-              <a:t>26.12.2017</a:t>
+              <a:t>10.03.2018</a:t>
             </a:fld>
             <a:endParaRPr lang="ru-RU"/>
           </a:p>
@@ -2049,7 +2134,7 @@
           <a:p>
             <a:fld id="{AA69D224-40D2-44AC-A010-8A9DDF5FAD53}" type="datetimeFigureOut">
               <a:rPr lang="ru-RU" smtClean="0"/>
-              <a:t>26.12.2017</a:t>
+              <a:t>10.03.2018</a:t>
             </a:fld>
             <a:endParaRPr lang="ru-RU"/>
           </a:p>
@@ -2167,7 +2252,7 @@
           <a:p>
             <a:fld id="{AA69D224-40D2-44AC-A010-8A9DDF5FAD53}" type="datetimeFigureOut">
               <a:rPr lang="ru-RU" smtClean="0"/>
-              <a:t>26.12.2017</a:t>
+              <a:t>10.03.2018</a:t>
             </a:fld>
             <a:endParaRPr lang="ru-RU"/>
           </a:p>
@@ -2262,7 +2347,7 @@
           <a:p>
             <a:fld id="{AA69D224-40D2-44AC-A010-8A9DDF5FAD53}" type="datetimeFigureOut">
               <a:rPr lang="ru-RU" smtClean="0"/>
-              <a:t>26.12.2017</a:t>
+              <a:t>10.03.2018</a:t>
             </a:fld>
             <a:endParaRPr lang="ru-RU"/>
           </a:p>
@@ -2539,7 +2624,7 @@
           <a:p>
             <a:fld id="{AA69D224-40D2-44AC-A010-8A9DDF5FAD53}" type="datetimeFigureOut">
               <a:rPr lang="ru-RU" smtClean="0"/>
-              <a:t>26.12.2017</a:t>
+              <a:t>10.03.2018</a:t>
             </a:fld>
             <a:endParaRPr lang="ru-RU"/>
           </a:p>
@@ -2792,7 +2877,7 @@
           <a:p>
             <a:fld id="{AA69D224-40D2-44AC-A010-8A9DDF5FAD53}" type="datetimeFigureOut">
               <a:rPr lang="ru-RU" smtClean="0"/>
-              <a:t>26.12.2017</a:t>
+              <a:t>10.03.2018</a:t>
             </a:fld>
             <a:endParaRPr lang="ru-RU"/>
           </a:p>
@@ -3005,7 +3090,7 @@
           <a:p>
             <a:fld id="{AA69D224-40D2-44AC-A010-8A9DDF5FAD53}" type="datetimeFigureOut">
               <a:rPr lang="ru-RU" smtClean="0"/>
-              <a:t>26.12.2017</a:t>
+              <a:t>10.03.2018</a:t>
             </a:fld>
             <a:endParaRPr lang="ru-RU"/>
           </a:p>
@@ -21158,6 +21243,1735 @@
 </p:sld>
 </file>
 
+<file path=ppt/slides/slide6.xml><?xml version="1.0" encoding="utf-8"?>
+<p:sld xmlns:a="http://schemas.openxmlformats.org/drawingml/2006/main" xmlns:r="http://schemas.openxmlformats.org/officeDocument/2006/relationships" xmlns:p="http://schemas.openxmlformats.org/presentationml/2006/main">
+  <p:cSld>
+    <p:spTree>
+      <p:nvGrpSpPr>
+        <p:cNvPr id="1" name=""/>
+        <p:cNvGrpSpPr/>
+        <p:nvPr/>
+      </p:nvGrpSpPr>
+      <p:grpSpPr>
+        <a:xfrm>
+          <a:off x="0" y="0"/>
+          <a:ext cx="0" cy="0"/>
+          <a:chOff x="0" y="0"/>
+          <a:chExt cx="0" cy="0"/>
+        </a:xfrm>
+      </p:grpSpPr>
+      <p:grpSp>
+        <p:nvGrpSpPr>
+          <p:cNvPr id="3" name="Group 2"/>
+          <p:cNvGrpSpPr/>
+          <p:nvPr/>
+        </p:nvGrpSpPr>
+        <p:grpSpPr>
+          <a:xfrm>
+            <a:off x="628698" y="1309860"/>
+            <a:ext cx="10075922" cy="3953573"/>
+            <a:chOff x="628698" y="1309860"/>
+            <a:chExt cx="10075922" cy="3953573"/>
+          </a:xfrm>
+        </p:grpSpPr>
+        <p:sp>
+          <p:nvSpPr>
+            <p:cNvPr id="2" name="Rectangle 1"/>
+            <p:cNvSpPr/>
+            <p:nvPr/>
+          </p:nvSpPr>
+          <p:spPr>
+            <a:xfrm>
+              <a:off x="628698" y="1309860"/>
+              <a:ext cx="9984179" cy="3953573"/>
+            </a:xfrm>
+            <a:prstGeom prst="rect">
+              <a:avLst/>
+            </a:prstGeom>
+          </p:spPr>
+          <p:style>
+            <a:lnRef idx="2">
+              <a:schemeClr val="dk1"/>
+            </a:lnRef>
+            <a:fillRef idx="1">
+              <a:schemeClr val="lt1"/>
+            </a:fillRef>
+            <a:effectRef idx="0">
+              <a:schemeClr val="dk1"/>
+            </a:effectRef>
+            <a:fontRef idx="minor">
+              <a:schemeClr val="dk1"/>
+            </a:fontRef>
+          </p:style>
+          <p:txBody>
+            <a:bodyPr rtlCol="0" anchor="ctr"/>
+            <a:lstStyle/>
+            <a:p>
+              <a:pPr algn="ctr"/>
+              <a:endParaRPr lang="ru-RU"/>
+            </a:p>
+          </p:txBody>
+        </p:sp>
+        <p:grpSp>
+          <p:nvGrpSpPr>
+            <p:cNvPr id="63" name="Group 62"/>
+            <p:cNvGrpSpPr/>
+            <p:nvPr/>
+          </p:nvGrpSpPr>
+          <p:grpSpPr>
+            <a:xfrm>
+              <a:off x="628698" y="1309860"/>
+              <a:ext cx="10075922" cy="3953573"/>
+              <a:chOff x="161771" y="1261222"/>
+              <a:chExt cx="10075922" cy="3953573"/>
+            </a:xfrm>
+          </p:grpSpPr>
+          <p:sp>
+            <p:nvSpPr>
+              <p:cNvPr id="4" name="Rounded Rectangle 3"/>
+              <p:cNvSpPr/>
+              <p:nvPr/>
+            </p:nvSpPr>
+            <p:spPr>
+              <a:xfrm>
+                <a:off x="244443" y="2553078"/>
+                <a:ext cx="1901228" cy="1131683"/>
+              </a:xfrm>
+              <a:prstGeom prst="roundRect">
+                <a:avLst/>
+              </a:prstGeom>
+            </p:spPr>
+            <p:style>
+              <a:lnRef idx="2">
+                <a:schemeClr val="accent1">
+                  <a:shade val="50000"/>
+                </a:schemeClr>
+              </a:lnRef>
+              <a:fillRef idx="1">
+                <a:schemeClr val="accent1"/>
+              </a:fillRef>
+              <a:effectRef idx="0">
+                <a:schemeClr val="accent1"/>
+              </a:effectRef>
+              <a:fontRef idx="minor">
+                <a:schemeClr val="lt1"/>
+              </a:fontRef>
+            </p:style>
+            <p:txBody>
+              <a:bodyPr rtlCol="0" anchor="ctr"/>
+              <a:lstStyle/>
+              <a:p>
+                <a:pPr algn="ctr"/>
+                <a:r>
+                  <a:rPr lang="ru-RU" dirty="0" smtClean="0"/>
+                  <a:t>До 10368 байт</a:t>
+                </a:r>
+                <a:endParaRPr lang="ru-RU" dirty="0"/>
+              </a:p>
+            </p:txBody>
+          </p:sp>
+          <p:sp>
+            <p:nvSpPr>
+              <p:cNvPr id="5" name="Right Arrow 4"/>
+              <p:cNvSpPr/>
+              <p:nvPr/>
+            </p:nvSpPr>
+            <p:spPr>
+              <a:xfrm>
+                <a:off x="2239199" y="2553077"/>
+                <a:ext cx="878186" cy="1131683"/>
+              </a:xfrm>
+              <a:prstGeom prst="rightArrow">
+                <a:avLst/>
+              </a:prstGeom>
+              <a:solidFill>
+                <a:srgbClr val="92D050"/>
+              </a:solidFill>
+            </p:spPr>
+            <p:style>
+              <a:lnRef idx="2">
+                <a:schemeClr val="accent1">
+                  <a:shade val="50000"/>
+                </a:schemeClr>
+              </a:lnRef>
+              <a:fillRef idx="1">
+                <a:schemeClr val="accent1"/>
+              </a:fillRef>
+              <a:effectRef idx="0">
+                <a:schemeClr val="accent1"/>
+              </a:effectRef>
+              <a:fontRef idx="minor">
+                <a:schemeClr val="lt1"/>
+              </a:fontRef>
+            </p:style>
+            <p:txBody>
+              <a:bodyPr rtlCol="0" anchor="ctr"/>
+              <a:lstStyle/>
+              <a:p>
+                <a:pPr algn="ctr"/>
+                <a:endParaRPr lang="ru-RU"/>
+              </a:p>
+            </p:txBody>
+          </p:sp>
+          <p:sp>
+            <p:nvSpPr>
+              <p:cNvPr id="6" name="Left Brace 5"/>
+              <p:cNvSpPr/>
+              <p:nvPr/>
+            </p:nvSpPr>
+            <p:spPr>
+              <a:xfrm>
+                <a:off x="3302995" y="1874068"/>
+                <a:ext cx="525103" cy="2489702"/>
+              </a:xfrm>
+              <a:prstGeom prst="leftBrace">
+                <a:avLst/>
+              </a:prstGeom>
+              <a:ln w="28575"/>
+            </p:spPr>
+            <p:style>
+              <a:lnRef idx="1">
+                <a:schemeClr val="accent1"/>
+              </a:lnRef>
+              <a:fillRef idx="0">
+                <a:schemeClr val="accent1"/>
+              </a:fillRef>
+              <a:effectRef idx="0">
+                <a:schemeClr val="accent1"/>
+              </a:effectRef>
+              <a:fontRef idx="minor">
+                <a:schemeClr val="tx1"/>
+              </a:fontRef>
+            </p:style>
+            <p:txBody>
+              <a:bodyPr rtlCol="0" anchor="ctr"/>
+              <a:lstStyle/>
+              <a:p>
+                <a:pPr algn="ctr"/>
+                <a:endParaRPr lang="ru-RU"/>
+              </a:p>
+            </p:txBody>
+          </p:sp>
+          <p:sp>
+            <p:nvSpPr>
+              <p:cNvPr id="7" name="Left Brace 6"/>
+              <p:cNvSpPr/>
+              <p:nvPr/>
+            </p:nvSpPr>
+            <p:spPr>
+              <a:xfrm rot="10800000">
+                <a:off x="4769654" y="1874068"/>
+                <a:ext cx="525103" cy="2489702"/>
+              </a:xfrm>
+              <a:prstGeom prst="leftBrace">
+                <a:avLst/>
+              </a:prstGeom>
+              <a:ln w="28575"/>
+            </p:spPr>
+            <p:style>
+              <a:lnRef idx="1">
+                <a:schemeClr val="accent1"/>
+              </a:lnRef>
+              <a:fillRef idx="0">
+                <a:schemeClr val="accent1"/>
+              </a:fillRef>
+              <a:effectRef idx="0">
+                <a:schemeClr val="accent1"/>
+              </a:effectRef>
+              <a:fontRef idx="minor">
+                <a:schemeClr val="tx1"/>
+              </a:fontRef>
+            </p:style>
+            <p:txBody>
+              <a:bodyPr rtlCol="0" anchor="ctr"/>
+              <a:lstStyle/>
+              <a:p>
+                <a:pPr algn="ctr"/>
+                <a:endParaRPr lang="ru-RU"/>
+              </a:p>
+            </p:txBody>
+          </p:sp>
+          <p:sp>
+            <p:nvSpPr>
+              <p:cNvPr id="8" name="Right Arrow 7"/>
+              <p:cNvSpPr/>
+              <p:nvPr/>
+            </p:nvSpPr>
+            <p:spPr>
+              <a:xfrm>
+                <a:off x="5457719" y="2553077"/>
+                <a:ext cx="878186" cy="1131683"/>
+              </a:xfrm>
+              <a:prstGeom prst="rightArrow">
+                <a:avLst/>
+              </a:prstGeom>
+              <a:solidFill>
+                <a:srgbClr val="92D050"/>
+              </a:solidFill>
+            </p:spPr>
+            <p:style>
+              <a:lnRef idx="2">
+                <a:schemeClr val="accent1">
+                  <a:shade val="50000"/>
+                </a:schemeClr>
+              </a:lnRef>
+              <a:fillRef idx="1">
+                <a:schemeClr val="accent1"/>
+              </a:fillRef>
+              <a:effectRef idx="0">
+                <a:schemeClr val="accent1"/>
+              </a:effectRef>
+              <a:fontRef idx="minor">
+                <a:schemeClr val="lt1"/>
+              </a:fontRef>
+            </p:style>
+            <p:txBody>
+              <a:bodyPr rtlCol="0" anchor="ctr"/>
+              <a:lstStyle/>
+              <a:p>
+                <a:pPr algn="ctr"/>
+                <a:endParaRPr lang="ru-RU"/>
+              </a:p>
+            </p:txBody>
+          </p:sp>
+          <p:sp>
+            <p:nvSpPr>
+              <p:cNvPr id="10" name="Rectangle 9"/>
+              <p:cNvSpPr/>
+              <p:nvPr/>
+            </p:nvSpPr>
+            <p:spPr>
+              <a:xfrm>
+                <a:off x="3637961" y="1978182"/>
+                <a:ext cx="1321813" cy="285185"/>
+              </a:xfrm>
+              <a:prstGeom prst="rect">
+                <a:avLst/>
+              </a:prstGeom>
+              <a:solidFill>
+                <a:schemeClr val="accent1">
+                  <a:lumMod val="50000"/>
+                </a:schemeClr>
+              </a:solidFill>
+            </p:spPr>
+            <p:style>
+              <a:lnRef idx="2">
+                <a:schemeClr val="accent1">
+                  <a:shade val="50000"/>
+                </a:schemeClr>
+              </a:lnRef>
+              <a:fillRef idx="1">
+                <a:schemeClr val="accent1"/>
+              </a:fillRef>
+              <a:effectRef idx="0">
+                <a:schemeClr val="accent1"/>
+              </a:effectRef>
+              <a:fontRef idx="minor">
+                <a:schemeClr val="lt1"/>
+              </a:fontRef>
+            </p:style>
+            <p:txBody>
+              <a:bodyPr rtlCol="0" anchor="ctr"/>
+              <a:lstStyle/>
+              <a:p>
+                <a:pPr algn="ctr"/>
+                <a:endParaRPr lang="ru-RU"/>
+              </a:p>
+            </p:txBody>
+          </p:sp>
+          <p:sp>
+            <p:nvSpPr>
+              <p:cNvPr id="11" name="Rectangle 10"/>
+              <p:cNvSpPr/>
+              <p:nvPr/>
+            </p:nvSpPr>
+            <p:spPr>
+              <a:xfrm>
+                <a:off x="3637960" y="2367481"/>
+                <a:ext cx="1321813" cy="285185"/>
+              </a:xfrm>
+              <a:prstGeom prst="rect">
+                <a:avLst/>
+              </a:prstGeom>
+              <a:solidFill>
+                <a:schemeClr val="accent1">
+                  <a:lumMod val="50000"/>
+                </a:schemeClr>
+              </a:solidFill>
+            </p:spPr>
+            <p:style>
+              <a:lnRef idx="2">
+                <a:schemeClr val="accent1">
+                  <a:shade val="50000"/>
+                </a:schemeClr>
+              </a:lnRef>
+              <a:fillRef idx="1">
+                <a:schemeClr val="accent1"/>
+              </a:fillRef>
+              <a:effectRef idx="0">
+                <a:schemeClr val="accent1"/>
+              </a:effectRef>
+              <a:fontRef idx="minor">
+                <a:schemeClr val="lt1"/>
+              </a:fontRef>
+            </p:style>
+            <p:txBody>
+              <a:bodyPr rtlCol="0" anchor="ctr"/>
+              <a:lstStyle/>
+              <a:p>
+                <a:pPr algn="ctr"/>
+                <a:endParaRPr lang="ru-RU"/>
+              </a:p>
+            </p:txBody>
+          </p:sp>
+          <p:sp>
+            <p:nvSpPr>
+              <p:cNvPr id="12" name="Rectangle 11"/>
+              <p:cNvSpPr/>
+              <p:nvPr/>
+            </p:nvSpPr>
+            <p:spPr>
+              <a:xfrm>
+                <a:off x="3637961" y="4006158"/>
+                <a:ext cx="1321813" cy="285185"/>
+              </a:xfrm>
+              <a:prstGeom prst="rect">
+                <a:avLst/>
+              </a:prstGeom>
+              <a:solidFill>
+                <a:schemeClr val="accent1">
+                  <a:lumMod val="50000"/>
+                </a:schemeClr>
+              </a:solidFill>
+            </p:spPr>
+            <p:style>
+              <a:lnRef idx="2">
+                <a:schemeClr val="accent1">
+                  <a:shade val="50000"/>
+                </a:schemeClr>
+              </a:lnRef>
+              <a:fillRef idx="1">
+                <a:schemeClr val="accent1"/>
+              </a:fillRef>
+              <a:effectRef idx="0">
+                <a:schemeClr val="accent1"/>
+              </a:effectRef>
+              <a:fontRef idx="minor">
+                <a:schemeClr val="lt1"/>
+              </a:fontRef>
+            </p:style>
+            <p:txBody>
+              <a:bodyPr rtlCol="0" anchor="ctr"/>
+              <a:lstStyle/>
+              <a:p>
+                <a:pPr algn="ctr"/>
+                <a:endParaRPr lang="ru-RU"/>
+              </a:p>
+            </p:txBody>
+          </p:sp>
+          <p:sp>
+            <p:nvSpPr>
+              <p:cNvPr id="13" name="Oval 12"/>
+              <p:cNvSpPr/>
+              <p:nvPr/>
+            </p:nvSpPr>
+            <p:spPr>
+              <a:xfrm>
+                <a:off x="4144969" y="2949172"/>
+                <a:ext cx="208229" cy="194649"/>
+              </a:xfrm>
+              <a:prstGeom prst="ellipse">
+                <a:avLst/>
+              </a:prstGeom>
+              <a:solidFill>
+                <a:schemeClr val="accent1">
+                  <a:lumMod val="50000"/>
+                </a:schemeClr>
+              </a:solidFill>
+            </p:spPr>
+            <p:style>
+              <a:lnRef idx="2">
+                <a:schemeClr val="accent1">
+                  <a:shade val="50000"/>
+                </a:schemeClr>
+              </a:lnRef>
+              <a:fillRef idx="1">
+                <a:schemeClr val="accent1"/>
+              </a:fillRef>
+              <a:effectRef idx="0">
+                <a:schemeClr val="accent1"/>
+              </a:effectRef>
+              <a:fontRef idx="minor">
+                <a:schemeClr val="lt1"/>
+              </a:fontRef>
+            </p:style>
+            <p:txBody>
+              <a:bodyPr rtlCol="0" anchor="ctr"/>
+              <a:lstStyle/>
+              <a:p>
+                <a:pPr algn="ctr"/>
+                <a:endParaRPr lang="ru-RU"/>
+              </a:p>
+            </p:txBody>
+          </p:sp>
+          <p:sp>
+            <p:nvSpPr>
+              <p:cNvPr id="14" name="Oval 13"/>
+              <p:cNvSpPr/>
+              <p:nvPr/>
+            </p:nvSpPr>
+            <p:spPr>
+              <a:xfrm>
+                <a:off x="4144968" y="3218495"/>
+                <a:ext cx="208229" cy="194649"/>
+              </a:xfrm>
+              <a:prstGeom prst="ellipse">
+                <a:avLst/>
+              </a:prstGeom>
+              <a:solidFill>
+                <a:schemeClr val="accent1">
+                  <a:lumMod val="50000"/>
+                </a:schemeClr>
+              </a:solidFill>
+            </p:spPr>
+            <p:style>
+              <a:lnRef idx="2">
+                <a:schemeClr val="accent1">
+                  <a:shade val="50000"/>
+                </a:schemeClr>
+              </a:lnRef>
+              <a:fillRef idx="1">
+                <a:schemeClr val="accent1"/>
+              </a:fillRef>
+              <a:effectRef idx="0">
+                <a:schemeClr val="accent1"/>
+              </a:effectRef>
+              <a:fontRef idx="minor">
+                <a:schemeClr val="lt1"/>
+              </a:fontRef>
+            </p:style>
+            <p:txBody>
+              <a:bodyPr rtlCol="0" anchor="ctr"/>
+              <a:lstStyle/>
+              <a:p>
+                <a:pPr algn="ctr"/>
+                <a:endParaRPr lang="ru-RU"/>
+              </a:p>
+            </p:txBody>
+          </p:sp>
+          <p:sp>
+            <p:nvSpPr>
+              <p:cNvPr id="15" name="Oval 14"/>
+              <p:cNvSpPr/>
+              <p:nvPr/>
+            </p:nvSpPr>
+            <p:spPr>
+              <a:xfrm>
+                <a:off x="4144968" y="3490111"/>
+                <a:ext cx="208229" cy="194649"/>
+              </a:xfrm>
+              <a:prstGeom prst="ellipse">
+                <a:avLst/>
+              </a:prstGeom>
+              <a:solidFill>
+                <a:schemeClr val="accent1">
+                  <a:lumMod val="50000"/>
+                </a:schemeClr>
+              </a:solidFill>
+            </p:spPr>
+            <p:style>
+              <a:lnRef idx="2">
+                <a:schemeClr val="accent1">
+                  <a:shade val="50000"/>
+                </a:schemeClr>
+              </a:lnRef>
+              <a:fillRef idx="1">
+                <a:schemeClr val="accent1"/>
+              </a:fillRef>
+              <a:effectRef idx="0">
+                <a:schemeClr val="accent1"/>
+              </a:effectRef>
+              <a:fontRef idx="minor">
+                <a:schemeClr val="lt1"/>
+              </a:fontRef>
+            </p:style>
+            <p:txBody>
+              <a:bodyPr rtlCol="0" anchor="ctr"/>
+              <a:lstStyle/>
+              <a:p>
+                <a:pPr algn="ctr"/>
+                <a:endParaRPr lang="ru-RU"/>
+              </a:p>
+            </p:txBody>
+          </p:sp>
+          <p:sp>
+            <p:nvSpPr>
+              <p:cNvPr id="16" name="Rectangle 15"/>
+              <p:cNvSpPr/>
+              <p:nvPr/>
+            </p:nvSpPr>
+            <p:spPr>
+              <a:xfrm>
+                <a:off x="6569799" y="2419538"/>
+                <a:ext cx="162962" cy="1398761"/>
+              </a:xfrm>
+              <a:prstGeom prst="rect">
+                <a:avLst/>
+              </a:prstGeom>
+            </p:spPr>
+            <p:style>
+              <a:lnRef idx="2">
+                <a:schemeClr val="accent6">
+                  <a:shade val="50000"/>
+                </a:schemeClr>
+              </a:lnRef>
+              <a:fillRef idx="1">
+                <a:schemeClr val="accent6"/>
+              </a:fillRef>
+              <a:effectRef idx="0">
+                <a:schemeClr val="accent6"/>
+              </a:effectRef>
+              <a:fontRef idx="minor">
+                <a:schemeClr val="lt1"/>
+              </a:fontRef>
+            </p:style>
+            <p:txBody>
+              <a:bodyPr rtlCol="0" anchor="ctr"/>
+              <a:lstStyle/>
+              <a:p>
+                <a:pPr algn="ctr"/>
+                <a:endParaRPr lang="ru-RU"/>
+              </a:p>
+            </p:txBody>
+          </p:sp>
+          <p:sp>
+            <p:nvSpPr>
+              <p:cNvPr id="17" name="Rectangle 16"/>
+              <p:cNvSpPr/>
+              <p:nvPr/>
+            </p:nvSpPr>
+            <p:spPr>
+              <a:xfrm>
+                <a:off x="6732761" y="2419537"/>
+                <a:ext cx="162962" cy="1398761"/>
+              </a:xfrm>
+              <a:prstGeom prst="rect">
+                <a:avLst/>
+              </a:prstGeom>
+            </p:spPr>
+            <p:style>
+              <a:lnRef idx="2">
+                <a:schemeClr val="accent6">
+                  <a:shade val="50000"/>
+                </a:schemeClr>
+              </a:lnRef>
+              <a:fillRef idx="1">
+                <a:schemeClr val="accent6"/>
+              </a:fillRef>
+              <a:effectRef idx="0">
+                <a:schemeClr val="accent6"/>
+              </a:effectRef>
+              <a:fontRef idx="minor">
+                <a:schemeClr val="lt1"/>
+              </a:fontRef>
+            </p:style>
+            <p:txBody>
+              <a:bodyPr rtlCol="0" anchor="ctr"/>
+              <a:lstStyle/>
+              <a:p>
+                <a:pPr algn="ctr"/>
+                <a:endParaRPr lang="ru-RU"/>
+              </a:p>
+            </p:txBody>
+          </p:sp>
+          <p:sp>
+            <p:nvSpPr>
+              <p:cNvPr id="18" name="Rectangle 17"/>
+              <p:cNvSpPr/>
+              <p:nvPr/>
+            </p:nvSpPr>
+            <p:spPr>
+              <a:xfrm>
+                <a:off x="6895723" y="2419537"/>
+                <a:ext cx="162962" cy="1398761"/>
+              </a:xfrm>
+              <a:prstGeom prst="rect">
+                <a:avLst/>
+              </a:prstGeom>
+            </p:spPr>
+            <p:style>
+              <a:lnRef idx="2">
+                <a:schemeClr val="accent6">
+                  <a:shade val="50000"/>
+                </a:schemeClr>
+              </a:lnRef>
+              <a:fillRef idx="1">
+                <a:schemeClr val="accent6"/>
+              </a:fillRef>
+              <a:effectRef idx="0">
+                <a:schemeClr val="accent6"/>
+              </a:effectRef>
+              <a:fontRef idx="minor">
+                <a:schemeClr val="lt1"/>
+              </a:fontRef>
+            </p:style>
+            <p:txBody>
+              <a:bodyPr rtlCol="0" anchor="ctr"/>
+              <a:lstStyle/>
+              <a:p>
+                <a:pPr algn="ctr"/>
+                <a:endParaRPr lang="ru-RU"/>
+              </a:p>
+            </p:txBody>
+          </p:sp>
+          <p:sp>
+            <p:nvSpPr>
+              <p:cNvPr id="19" name="Rectangle 18"/>
+              <p:cNvSpPr/>
+              <p:nvPr/>
+            </p:nvSpPr>
+            <p:spPr>
+              <a:xfrm>
+                <a:off x="7060196" y="2419537"/>
+                <a:ext cx="162962" cy="1398761"/>
+              </a:xfrm>
+              <a:prstGeom prst="rect">
+                <a:avLst/>
+              </a:prstGeom>
+            </p:spPr>
+            <p:style>
+              <a:lnRef idx="2">
+                <a:schemeClr val="accent6">
+                  <a:shade val="50000"/>
+                </a:schemeClr>
+              </a:lnRef>
+              <a:fillRef idx="1">
+                <a:schemeClr val="accent6"/>
+              </a:fillRef>
+              <a:effectRef idx="0">
+                <a:schemeClr val="accent6"/>
+              </a:effectRef>
+              <a:fontRef idx="minor">
+                <a:schemeClr val="lt1"/>
+              </a:fontRef>
+            </p:style>
+            <p:txBody>
+              <a:bodyPr rtlCol="0" anchor="ctr"/>
+              <a:lstStyle/>
+              <a:p>
+                <a:pPr algn="ctr"/>
+                <a:endParaRPr lang="ru-RU"/>
+              </a:p>
+            </p:txBody>
+          </p:sp>
+          <p:sp>
+            <p:nvSpPr>
+              <p:cNvPr id="21" name="Rectangle 20"/>
+              <p:cNvSpPr/>
+              <p:nvPr/>
+            </p:nvSpPr>
+            <p:spPr>
+              <a:xfrm>
+                <a:off x="7310677" y="2419538"/>
+                <a:ext cx="162962" cy="1398761"/>
+              </a:xfrm>
+              <a:prstGeom prst="rect">
+                <a:avLst/>
+              </a:prstGeom>
+            </p:spPr>
+            <p:style>
+              <a:lnRef idx="2">
+                <a:schemeClr val="accent6">
+                  <a:shade val="50000"/>
+                </a:schemeClr>
+              </a:lnRef>
+              <a:fillRef idx="1">
+                <a:schemeClr val="accent6"/>
+              </a:fillRef>
+              <a:effectRef idx="0">
+                <a:schemeClr val="accent6"/>
+              </a:effectRef>
+              <a:fontRef idx="minor">
+                <a:schemeClr val="lt1"/>
+              </a:fontRef>
+            </p:style>
+            <p:txBody>
+              <a:bodyPr rtlCol="0" anchor="ctr"/>
+              <a:lstStyle/>
+              <a:p>
+                <a:pPr algn="ctr"/>
+                <a:endParaRPr lang="ru-RU"/>
+              </a:p>
+            </p:txBody>
+          </p:sp>
+          <p:sp>
+            <p:nvSpPr>
+              <p:cNvPr id="22" name="Rectangle 21"/>
+              <p:cNvSpPr/>
+              <p:nvPr/>
+            </p:nvSpPr>
+            <p:spPr>
+              <a:xfrm>
+                <a:off x="7473639" y="2419537"/>
+                <a:ext cx="162962" cy="1398761"/>
+              </a:xfrm>
+              <a:prstGeom prst="rect">
+                <a:avLst/>
+              </a:prstGeom>
+            </p:spPr>
+            <p:style>
+              <a:lnRef idx="2">
+                <a:schemeClr val="accent6">
+                  <a:shade val="50000"/>
+                </a:schemeClr>
+              </a:lnRef>
+              <a:fillRef idx="1">
+                <a:schemeClr val="accent6"/>
+              </a:fillRef>
+              <a:effectRef idx="0">
+                <a:schemeClr val="accent6"/>
+              </a:effectRef>
+              <a:fontRef idx="minor">
+                <a:schemeClr val="lt1"/>
+              </a:fontRef>
+            </p:style>
+            <p:txBody>
+              <a:bodyPr rtlCol="0" anchor="ctr"/>
+              <a:lstStyle/>
+              <a:p>
+                <a:pPr algn="ctr"/>
+                <a:endParaRPr lang="ru-RU"/>
+              </a:p>
+            </p:txBody>
+          </p:sp>
+          <p:sp>
+            <p:nvSpPr>
+              <p:cNvPr id="23" name="Rectangle 22"/>
+              <p:cNvSpPr/>
+              <p:nvPr/>
+            </p:nvSpPr>
+            <p:spPr>
+              <a:xfrm>
+                <a:off x="7636601" y="2419537"/>
+                <a:ext cx="162962" cy="1398761"/>
+              </a:xfrm>
+              <a:prstGeom prst="rect">
+                <a:avLst/>
+              </a:prstGeom>
+            </p:spPr>
+            <p:style>
+              <a:lnRef idx="2">
+                <a:schemeClr val="accent6">
+                  <a:shade val="50000"/>
+                </a:schemeClr>
+              </a:lnRef>
+              <a:fillRef idx="1">
+                <a:schemeClr val="accent6"/>
+              </a:fillRef>
+              <a:effectRef idx="0">
+                <a:schemeClr val="accent6"/>
+              </a:effectRef>
+              <a:fontRef idx="minor">
+                <a:schemeClr val="lt1"/>
+              </a:fontRef>
+            </p:style>
+            <p:txBody>
+              <a:bodyPr rtlCol="0" anchor="ctr"/>
+              <a:lstStyle/>
+              <a:p>
+                <a:pPr algn="ctr"/>
+                <a:endParaRPr lang="ru-RU"/>
+              </a:p>
+            </p:txBody>
+          </p:sp>
+          <p:sp>
+            <p:nvSpPr>
+              <p:cNvPr id="24" name="Rectangle 23"/>
+              <p:cNvSpPr/>
+              <p:nvPr/>
+            </p:nvSpPr>
+            <p:spPr>
+              <a:xfrm>
+                <a:off x="7801074" y="2419537"/>
+                <a:ext cx="162962" cy="1398761"/>
+              </a:xfrm>
+              <a:prstGeom prst="rect">
+                <a:avLst/>
+              </a:prstGeom>
+            </p:spPr>
+            <p:style>
+              <a:lnRef idx="2">
+                <a:schemeClr val="accent6">
+                  <a:shade val="50000"/>
+                </a:schemeClr>
+              </a:lnRef>
+              <a:fillRef idx="1">
+                <a:schemeClr val="accent6"/>
+              </a:fillRef>
+              <a:effectRef idx="0">
+                <a:schemeClr val="accent6"/>
+              </a:effectRef>
+              <a:fontRef idx="minor">
+                <a:schemeClr val="lt1"/>
+              </a:fontRef>
+            </p:style>
+            <p:txBody>
+              <a:bodyPr rtlCol="0" anchor="ctr"/>
+              <a:lstStyle/>
+              <a:p>
+                <a:pPr algn="ctr"/>
+                <a:endParaRPr lang="ru-RU"/>
+              </a:p>
+            </p:txBody>
+          </p:sp>
+          <p:sp>
+            <p:nvSpPr>
+              <p:cNvPr id="25" name="Rectangle 24"/>
+              <p:cNvSpPr/>
+              <p:nvPr/>
+            </p:nvSpPr>
+            <p:spPr>
+              <a:xfrm>
+                <a:off x="8066648" y="2417279"/>
+                <a:ext cx="162962" cy="1398761"/>
+              </a:xfrm>
+              <a:prstGeom prst="rect">
+                <a:avLst/>
+              </a:prstGeom>
+            </p:spPr>
+            <p:style>
+              <a:lnRef idx="2">
+                <a:schemeClr val="accent6">
+                  <a:shade val="50000"/>
+                </a:schemeClr>
+              </a:lnRef>
+              <a:fillRef idx="1">
+                <a:schemeClr val="accent6"/>
+              </a:fillRef>
+              <a:effectRef idx="0">
+                <a:schemeClr val="accent6"/>
+              </a:effectRef>
+              <a:fontRef idx="minor">
+                <a:schemeClr val="lt1"/>
+              </a:fontRef>
+            </p:style>
+            <p:txBody>
+              <a:bodyPr rtlCol="0" anchor="ctr"/>
+              <a:lstStyle/>
+              <a:p>
+                <a:pPr algn="ctr"/>
+                <a:endParaRPr lang="ru-RU"/>
+              </a:p>
+            </p:txBody>
+          </p:sp>
+          <p:sp>
+            <p:nvSpPr>
+              <p:cNvPr id="26" name="Rectangle 25"/>
+              <p:cNvSpPr/>
+              <p:nvPr/>
+            </p:nvSpPr>
+            <p:spPr>
+              <a:xfrm>
+                <a:off x="8229610" y="2417278"/>
+                <a:ext cx="162962" cy="1398761"/>
+              </a:xfrm>
+              <a:prstGeom prst="rect">
+                <a:avLst/>
+              </a:prstGeom>
+            </p:spPr>
+            <p:style>
+              <a:lnRef idx="2">
+                <a:schemeClr val="accent6">
+                  <a:shade val="50000"/>
+                </a:schemeClr>
+              </a:lnRef>
+              <a:fillRef idx="1">
+                <a:schemeClr val="accent6"/>
+              </a:fillRef>
+              <a:effectRef idx="0">
+                <a:schemeClr val="accent6"/>
+              </a:effectRef>
+              <a:fontRef idx="minor">
+                <a:schemeClr val="lt1"/>
+              </a:fontRef>
+            </p:style>
+            <p:txBody>
+              <a:bodyPr rtlCol="0" anchor="ctr"/>
+              <a:lstStyle/>
+              <a:p>
+                <a:pPr algn="ctr"/>
+                <a:endParaRPr lang="ru-RU"/>
+              </a:p>
+            </p:txBody>
+          </p:sp>
+          <p:sp>
+            <p:nvSpPr>
+              <p:cNvPr id="27" name="Rectangle 26"/>
+              <p:cNvSpPr/>
+              <p:nvPr/>
+            </p:nvSpPr>
+            <p:spPr>
+              <a:xfrm>
+                <a:off x="8392572" y="2417278"/>
+                <a:ext cx="162962" cy="1398761"/>
+              </a:xfrm>
+              <a:prstGeom prst="rect">
+                <a:avLst/>
+              </a:prstGeom>
+            </p:spPr>
+            <p:style>
+              <a:lnRef idx="2">
+                <a:schemeClr val="accent6">
+                  <a:shade val="50000"/>
+                </a:schemeClr>
+              </a:lnRef>
+              <a:fillRef idx="1">
+                <a:schemeClr val="accent6"/>
+              </a:fillRef>
+              <a:effectRef idx="0">
+                <a:schemeClr val="accent6"/>
+              </a:effectRef>
+              <a:fontRef idx="minor">
+                <a:schemeClr val="lt1"/>
+              </a:fontRef>
+            </p:style>
+            <p:txBody>
+              <a:bodyPr rtlCol="0" anchor="ctr"/>
+              <a:lstStyle/>
+              <a:p>
+                <a:pPr algn="ctr"/>
+                <a:endParaRPr lang="ru-RU"/>
+              </a:p>
+            </p:txBody>
+          </p:sp>
+          <p:sp>
+            <p:nvSpPr>
+              <p:cNvPr id="28" name="Rectangle 27"/>
+              <p:cNvSpPr/>
+              <p:nvPr/>
+            </p:nvSpPr>
+            <p:spPr>
+              <a:xfrm>
+                <a:off x="8557045" y="2417278"/>
+                <a:ext cx="162962" cy="1398761"/>
+              </a:xfrm>
+              <a:prstGeom prst="rect">
+                <a:avLst/>
+              </a:prstGeom>
+            </p:spPr>
+            <p:style>
+              <a:lnRef idx="2">
+                <a:schemeClr val="accent6">
+                  <a:shade val="50000"/>
+                </a:schemeClr>
+              </a:lnRef>
+              <a:fillRef idx="1">
+                <a:schemeClr val="accent6"/>
+              </a:fillRef>
+              <a:effectRef idx="0">
+                <a:schemeClr val="accent6"/>
+              </a:effectRef>
+              <a:fontRef idx="minor">
+                <a:schemeClr val="lt1"/>
+              </a:fontRef>
+            </p:style>
+            <p:txBody>
+              <a:bodyPr rtlCol="0" anchor="ctr"/>
+              <a:lstStyle/>
+              <a:p>
+                <a:pPr algn="ctr"/>
+                <a:endParaRPr lang="ru-RU"/>
+              </a:p>
+            </p:txBody>
+          </p:sp>
+          <p:sp>
+            <p:nvSpPr>
+              <p:cNvPr id="33" name="Rectangle 32"/>
+              <p:cNvSpPr/>
+              <p:nvPr/>
+            </p:nvSpPr>
+            <p:spPr>
+              <a:xfrm>
+                <a:off x="8807526" y="2417279"/>
+                <a:ext cx="162962" cy="1398761"/>
+              </a:xfrm>
+              <a:prstGeom prst="rect">
+                <a:avLst/>
+              </a:prstGeom>
+            </p:spPr>
+            <p:style>
+              <a:lnRef idx="2">
+                <a:schemeClr val="accent6">
+                  <a:shade val="50000"/>
+                </a:schemeClr>
+              </a:lnRef>
+              <a:fillRef idx="1">
+                <a:schemeClr val="accent6"/>
+              </a:fillRef>
+              <a:effectRef idx="0">
+                <a:schemeClr val="accent6"/>
+              </a:effectRef>
+              <a:fontRef idx="minor">
+                <a:schemeClr val="lt1"/>
+              </a:fontRef>
+            </p:style>
+            <p:txBody>
+              <a:bodyPr rtlCol="0" anchor="ctr"/>
+              <a:lstStyle/>
+              <a:p>
+                <a:pPr algn="ctr"/>
+                <a:endParaRPr lang="ru-RU"/>
+              </a:p>
+            </p:txBody>
+          </p:sp>
+          <p:sp>
+            <p:nvSpPr>
+              <p:cNvPr id="34" name="Rectangle 33"/>
+              <p:cNvSpPr/>
+              <p:nvPr/>
+            </p:nvSpPr>
+            <p:spPr>
+              <a:xfrm>
+                <a:off x="8970488" y="2417278"/>
+                <a:ext cx="162962" cy="1398761"/>
+              </a:xfrm>
+              <a:prstGeom prst="rect">
+                <a:avLst/>
+              </a:prstGeom>
+            </p:spPr>
+            <p:style>
+              <a:lnRef idx="2">
+                <a:schemeClr val="accent6">
+                  <a:shade val="50000"/>
+                </a:schemeClr>
+              </a:lnRef>
+              <a:fillRef idx="1">
+                <a:schemeClr val="accent6"/>
+              </a:fillRef>
+              <a:effectRef idx="0">
+                <a:schemeClr val="accent6"/>
+              </a:effectRef>
+              <a:fontRef idx="minor">
+                <a:schemeClr val="lt1"/>
+              </a:fontRef>
+            </p:style>
+            <p:txBody>
+              <a:bodyPr rtlCol="0" anchor="ctr"/>
+              <a:lstStyle/>
+              <a:p>
+                <a:pPr algn="ctr"/>
+                <a:endParaRPr lang="ru-RU"/>
+              </a:p>
+            </p:txBody>
+          </p:sp>
+          <p:sp>
+            <p:nvSpPr>
+              <p:cNvPr id="35" name="Rectangle 34"/>
+              <p:cNvSpPr/>
+              <p:nvPr/>
+            </p:nvSpPr>
+            <p:spPr>
+              <a:xfrm>
+                <a:off x="9133450" y="2417278"/>
+                <a:ext cx="162962" cy="1398761"/>
+              </a:xfrm>
+              <a:prstGeom prst="rect">
+                <a:avLst/>
+              </a:prstGeom>
+            </p:spPr>
+            <p:style>
+              <a:lnRef idx="2">
+                <a:schemeClr val="accent6">
+                  <a:shade val="50000"/>
+                </a:schemeClr>
+              </a:lnRef>
+              <a:fillRef idx="1">
+                <a:schemeClr val="accent6"/>
+              </a:fillRef>
+              <a:effectRef idx="0">
+                <a:schemeClr val="accent6"/>
+              </a:effectRef>
+              <a:fontRef idx="minor">
+                <a:schemeClr val="lt1"/>
+              </a:fontRef>
+            </p:style>
+            <p:txBody>
+              <a:bodyPr rtlCol="0" anchor="ctr"/>
+              <a:lstStyle/>
+              <a:p>
+                <a:pPr algn="ctr"/>
+                <a:endParaRPr lang="ru-RU"/>
+              </a:p>
+            </p:txBody>
+          </p:sp>
+          <p:sp>
+            <p:nvSpPr>
+              <p:cNvPr id="36" name="Rectangle 35"/>
+              <p:cNvSpPr/>
+              <p:nvPr/>
+            </p:nvSpPr>
+            <p:spPr>
+              <a:xfrm>
+                <a:off x="9297923" y="2417278"/>
+                <a:ext cx="162962" cy="1398761"/>
+              </a:xfrm>
+              <a:prstGeom prst="rect">
+                <a:avLst/>
+              </a:prstGeom>
+              <a:solidFill>
+                <a:srgbClr val="C00000"/>
+              </a:solidFill>
+            </p:spPr>
+            <p:style>
+              <a:lnRef idx="2">
+                <a:schemeClr val="accent2">
+                  <a:shade val="50000"/>
+                </a:schemeClr>
+              </a:lnRef>
+              <a:fillRef idx="1">
+                <a:schemeClr val="accent2"/>
+              </a:fillRef>
+              <a:effectRef idx="0">
+                <a:schemeClr val="accent2"/>
+              </a:effectRef>
+              <a:fontRef idx="minor">
+                <a:schemeClr val="lt1"/>
+              </a:fontRef>
+            </p:style>
+            <p:txBody>
+              <a:bodyPr rtlCol="0" anchor="ctr"/>
+              <a:lstStyle/>
+              <a:p>
+                <a:pPr algn="ctr"/>
+                <a:endParaRPr lang="ru-RU"/>
+              </a:p>
+            </p:txBody>
+          </p:sp>
+          <p:sp>
+            <p:nvSpPr>
+              <p:cNvPr id="38" name="Rectangle 37"/>
+              <p:cNvSpPr/>
+              <p:nvPr/>
+            </p:nvSpPr>
+            <p:spPr>
+              <a:xfrm>
+                <a:off x="6405325" y="3413144"/>
+                <a:ext cx="156927" cy="402895"/>
+              </a:xfrm>
+              <a:prstGeom prst="rect">
+                <a:avLst/>
+              </a:prstGeom>
+              <a:solidFill>
+                <a:srgbClr val="FFC000"/>
+              </a:solidFill>
+            </p:spPr>
+            <p:style>
+              <a:lnRef idx="2">
+                <a:schemeClr val="accent2">
+                  <a:shade val="50000"/>
+                </a:schemeClr>
+              </a:lnRef>
+              <a:fillRef idx="1">
+                <a:schemeClr val="accent2"/>
+              </a:fillRef>
+              <a:effectRef idx="0">
+                <a:schemeClr val="accent2"/>
+              </a:effectRef>
+              <a:fontRef idx="minor">
+                <a:schemeClr val="lt1"/>
+              </a:fontRef>
+            </p:style>
+            <p:txBody>
+              <a:bodyPr rtlCol="0" anchor="ctr"/>
+              <a:lstStyle/>
+              <a:p>
+                <a:pPr algn="ctr"/>
+                <a:endParaRPr lang="ru-RU"/>
+              </a:p>
+            </p:txBody>
+          </p:sp>
+          <p:sp>
+            <p:nvSpPr>
+              <p:cNvPr id="41" name="TextBox 40"/>
+              <p:cNvSpPr txBox="1"/>
+              <p:nvPr/>
+            </p:nvSpPr>
+            <p:spPr>
+              <a:xfrm>
+                <a:off x="161771" y="1261222"/>
+                <a:ext cx="2077428" cy="369332"/>
+              </a:xfrm>
+              <a:prstGeom prst="rect">
+                <a:avLst/>
+              </a:prstGeom>
+              <a:noFill/>
+            </p:spPr>
+            <p:txBody>
+              <a:bodyPr wrap="none" rtlCol="0">
+                <a:spAutoFit/>
+              </a:bodyPr>
+              <a:lstStyle/>
+              <a:p>
+                <a:r>
+                  <a:rPr lang="ru-RU" dirty="0" smtClean="0"/>
+                  <a:t>Пакет фабрики (</a:t>
+                </a:r>
+                <a:r>
+                  <a:rPr lang="en-US" dirty="0" smtClean="0"/>
+                  <a:t>FP</a:t>
+                </a:r>
+                <a:r>
+                  <a:rPr lang="ru-RU" dirty="0" smtClean="0"/>
+                  <a:t>)</a:t>
+                </a:r>
+                <a:endParaRPr lang="ru-RU" dirty="0"/>
+              </a:p>
+            </p:txBody>
+          </p:sp>
+          <p:sp>
+            <p:nvSpPr>
+              <p:cNvPr id="42" name="TextBox 41"/>
+              <p:cNvSpPr txBox="1"/>
+              <p:nvPr/>
+            </p:nvSpPr>
+            <p:spPr>
+              <a:xfrm>
+                <a:off x="2382174" y="1261222"/>
+                <a:ext cx="3733816" cy="923330"/>
+              </a:xfrm>
+              <a:prstGeom prst="rect">
+                <a:avLst/>
+              </a:prstGeom>
+              <a:noFill/>
+            </p:spPr>
+            <p:txBody>
+              <a:bodyPr wrap="square" rtlCol="0">
+                <a:spAutoFit/>
+              </a:bodyPr>
+              <a:lstStyle/>
+              <a:p>
+                <a:r>
+                  <a:rPr lang="ru-RU" dirty="0" smtClean="0"/>
+                  <a:t>Инферфейс Уровень 2 – Уровень 1.5 сегментирует</a:t>
+                </a:r>
+                <a:r>
+                  <a:rPr lang="en-US" dirty="0" smtClean="0"/>
+                  <a:t> </a:t>
+                </a:r>
+                <a:r>
+                  <a:rPr lang="ru-RU" dirty="0" smtClean="0"/>
+                  <a:t>данные в 65-битные </a:t>
+                </a:r>
+                <a:r>
+                  <a:rPr lang="en-US" dirty="0" smtClean="0"/>
+                  <a:t>FLITs</a:t>
+                </a:r>
+                <a:endParaRPr lang="ru-RU" dirty="0"/>
+              </a:p>
+            </p:txBody>
+          </p:sp>
+          <p:sp>
+            <p:nvSpPr>
+              <p:cNvPr id="43" name="TextBox 42"/>
+              <p:cNvSpPr txBox="1"/>
+              <p:nvPr/>
+            </p:nvSpPr>
+            <p:spPr>
+              <a:xfrm>
+                <a:off x="6106570" y="1261222"/>
+                <a:ext cx="3843217" cy="646331"/>
+              </a:xfrm>
+              <a:prstGeom prst="rect">
+                <a:avLst/>
+              </a:prstGeom>
+              <a:noFill/>
+            </p:spPr>
+            <p:txBody>
+              <a:bodyPr wrap="square" rtlCol="0">
+                <a:spAutoFit/>
+              </a:bodyPr>
+              <a:lstStyle/>
+              <a:p>
+                <a:r>
+                  <a:rPr lang="en-US" dirty="0" smtClean="0"/>
+                  <a:t>LTPs </a:t>
+                </a:r>
+                <a:r>
+                  <a:rPr lang="ru-RU" dirty="0" smtClean="0"/>
+                  <a:t>создаются путем объединения 16 </a:t>
+                </a:r>
+                <a:r>
+                  <a:rPr lang="en-US" dirty="0" smtClean="0"/>
+                  <a:t>FLITs</a:t>
+                </a:r>
+                <a:r>
+                  <a:rPr lang="ru-RU" dirty="0" smtClean="0"/>
+                  <a:t>, </a:t>
+                </a:r>
+                <a:r>
+                  <a:rPr lang="en-US" dirty="0" smtClean="0"/>
+                  <a:t>CRC</a:t>
+                </a:r>
+                <a:r>
+                  <a:rPr lang="ru-RU" dirty="0" smtClean="0"/>
+                  <a:t> и </a:t>
+                </a:r>
+                <a:r>
+                  <a:rPr lang="en-US" dirty="0" smtClean="0"/>
+                  <a:t>VL </a:t>
+                </a:r>
+                <a:r>
+                  <a:rPr lang="ru-RU" dirty="0" smtClean="0"/>
+                  <a:t>кредита</a:t>
+                </a:r>
+                <a:r>
+                  <a:rPr lang="en-US" dirty="0" smtClean="0"/>
+                  <a:t> </a:t>
+                </a:r>
+                <a:r>
+                  <a:rPr lang="ru-RU" dirty="0" smtClean="0"/>
+                  <a:t>вместе</a:t>
+                </a:r>
+                <a:endParaRPr lang="ru-RU" dirty="0"/>
+              </a:p>
+            </p:txBody>
+          </p:sp>
+          <p:sp>
+            <p:nvSpPr>
+              <p:cNvPr id="44" name="TextBox 43"/>
+              <p:cNvSpPr txBox="1"/>
+              <p:nvPr/>
+            </p:nvSpPr>
+            <p:spPr>
+              <a:xfrm>
+                <a:off x="3511631" y="4845463"/>
+                <a:ext cx="1574470" cy="369332"/>
+              </a:xfrm>
+              <a:prstGeom prst="rect">
+                <a:avLst/>
+              </a:prstGeom>
+              <a:noFill/>
+            </p:spPr>
+            <p:txBody>
+              <a:bodyPr wrap="none" rtlCol="0">
+                <a:spAutoFit/>
+              </a:bodyPr>
+              <a:lstStyle/>
+              <a:p>
+                <a:r>
+                  <a:rPr lang="ru-RU" dirty="0" smtClean="0"/>
+                  <a:t>1 </a:t>
+                </a:r>
+                <a:r>
+                  <a:rPr lang="en-US" dirty="0" smtClean="0"/>
+                  <a:t>FLIT = 65 </a:t>
+                </a:r>
+                <a:r>
+                  <a:rPr lang="ru-RU" dirty="0" smtClean="0"/>
+                  <a:t>бит</a:t>
+                </a:r>
+                <a:endParaRPr lang="ru-RU" dirty="0"/>
+              </a:p>
+            </p:txBody>
+          </p:sp>
+          <p:sp>
+            <p:nvSpPr>
+              <p:cNvPr id="45" name="TextBox 44"/>
+              <p:cNvSpPr txBox="1"/>
+              <p:nvPr/>
+            </p:nvSpPr>
+            <p:spPr>
+              <a:xfrm>
+                <a:off x="5818663" y="4821019"/>
+                <a:ext cx="4419030" cy="369332"/>
+              </a:xfrm>
+              <a:prstGeom prst="rect">
+                <a:avLst/>
+              </a:prstGeom>
+              <a:noFill/>
+            </p:spPr>
+            <p:txBody>
+              <a:bodyPr wrap="none" rtlCol="0">
+                <a:spAutoFit/>
+              </a:bodyPr>
+              <a:lstStyle/>
+              <a:p>
+                <a:r>
+                  <a:rPr lang="ru-RU" dirty="0" smtClean="0"/>
+                  <a:t>1056</a:t>
+                </a:r>
+                <a:r>
+                  <a:rPr lang="en-US" dirty="0" smtClean="0"/>
+                  <a:t>-</a:t>
+                </a:r>
+                <a:r>
+                  <a:rPr lang="ru-RU" dirty="0" smtClean="0"/>
+                  <a:t>битный </a:t>
+                </a:r>
+                <a:r>
+                  <a:rPr lang="en-US" dirty="0" smtClean="0"/>
+                  <a:t>LTP = </a:t>
+                </a:r>
+                <a:r>
+                  <a:rPr lang="ru-RU" dirty="0" smtClean="0"/>
+                  <a:t>16 </a:t>
+                </a:r>
+                <a:r>
+                  <a:rPr lang="en-US" dirty="0" smtClean="0"/>
+                  <a:t>FLITs + CRC + VL credit</a:t>
+                </a:r>
+                <a:endParaRPr lang="ru-RU" dirty="0"/>
+              </a:p>
+            </p:txBody>
+          </p:sp>
+          <p:sp>
+            <p:nvSpPr>
+              <p:cNvPr id="46" name="TextBox 45"/>
+              <p:cNvSpPr txBox="1"/>
+              <p:nvPr/>
+            </p:nvSpPr>
+            <p:spPr>
+              <a:xfrm>
+                <a:off x="5671862" y="4006158"/>
+                <a:ext cx="726881" cy="584775"/>
+              </a:xfrm>
+              <a:prstGeom prst="rect">
+                <a:avLst/>
+              </a:prstGeom>
+              <a:noFill/>
+            </p:spPr>
+            <p:txBody>
+              <a:bodyPr wrap="square" rtlCol="0">
+                <a:spAutoFit/>
+              </a:bodyPr>
+              <a:lstStyle/>
+              <a:p>
+                <a:r>
+                  <a:rPr lang="en-US" sz="1600" dirty="0" smtClean="0"/>
+                  <a:t>CRC &amp; credit</a:t>
+                </a:r>
+                <a:endParaRPr lang="ru-RU" sz="1600" dirty="0"/>
+              </a:p>
+            </p:txBody>
+          </p:sp>
+          <p:cxnSp>
+            <p:nvCxnSpPr>
+              <p:cNvPr id="48" name="Straight Arrow Connector 47"/>
+              <p:cNvCxnSpPr>
+                <a:stCxn id="46" idx="0"/>
+              </p:cNvCxnSpPr>
+              <p:nvPr/>
+            </p:nvCxnSpPr>
+            <p:spPr>
+              <a:xfrm flipV="1">
+                <a:off x="6035303" y="3684760"/>
+                <a:ext cx="363440" cy="321398"/>
+              </a:xfrm>
+              <a:prstGeom prst="straightConnector1">
+                <a:avLst/>
+              </a:prstGeom>
+              <a:ln>
+                <a:tailEnd type="triangle"/>
+              </a:ln>
+            </p:spPr>
+            <p:style>
+              <a:lnRef idx="1">
+                <a:schemeClr val="accent1"/>
+              </a:lnRef>
+              <a:fillRef idx="0">
+                <a:schemeClr val="accent1"/>
+              </a:fillRef>
+              <a:effectRef idx="0">
+                <a:schemeClr val="accent1"/>
+              </a:effectRef>
+              <a:fontRef idx="minor">
+                <a:schemeClr val="tx1"/>
+              </a:fontRef>
+            </p:style>
+          </p:cxnSp>
+          <p:sp>
+            <p:nvSpPr>
+              <p:cNvPr id="51" name="TextBox 50"/>
+              <p:cNvSpPr txBox="1"/>
+              <p:nvPr/>
+            </p:nvSpPr>
+            <p:spPr>
+              <a:xfrm>
+                <a:off x="6720553" y="4161005"/>
+                <a:ext cx="835936" cy="338554"/>
+              </a:xfrm>
+              <a:prstGeom prst="rect">
+                <a:avLst/>
+              </a:prstGeom>
+              <a:noFill/>
+            </p:spPr>
+            <p:txBody>
+              <a:bodyPr wrap="square" rtlCol="0">
+                <a:spAutoFit/>
+              </a:bodyPr>
+              <a:lstStyle/>
+              <a:p>
+                <a:r>
+                  <a:rPr lang="en-US" sz="1600" dirty="0" smtClean="0"/>
+                  <a:t>FP FLITs</a:t>
+                </a:r>
+                <a:endParaRPr lang="ru-RU" sz="1600" dirty="0"/>
+              </a:p>
+            </p:txBody>
+          </p:sp>
+          <p:cxnSp>
+            <p:nvCxnSpPr>
+              <p:cNvPr id="52" name="Straight Arrow Connector 51"/>
+              <p:cNvCxnSpPr>
+                <a:stCxn id="51" idx="0"/>
+                <a:endCxn id="19" idx="2"/>
+              </p:cNvCxnSpPr>
+              <p:nvPr/>
+            </p:nvCxnSpPr>
+            <p:spPr>
+              <a:xfrm flipV="1">
+                <a:off x="7138521" y="3818298"/>
+                <a:ext cx="3156" cy="342707"/>
+              </a:xfrm>
+              <a:prstGeom prst="straightConnector1">
+                <a:avLst/>
+              </a:prstGeom>
+              <a:ln>
+                <a:tailEnd type="triangle"/>
+              </a:ln>
+            </p:spPr>
+            <p:style>
+              <a:lnRef idx="1">
+                <a:schemeClr val="accent1"/>
+              </a:lnRef>
+              <a:fillRef idx="0">
+                <a:schemeClr val="accent1"/>
+              </a:fillRef>
+              <a:effectRef idx="0">
+                <a:schemeClr val="accent1"/>
+              </a:effectRef>
+              <a:fontRef idx="minor">
+                <a:schemeClr val="tx1"/>
+              </a:fontRef>
+            </p:style>
+          </p:cxnSp>
+          <p:cxnSp>
+            <p:nvCxnSpPr>
+              <p:cNvPr id="55" name="Straight Arrow Connector 54"/>
+              <p:cNvCxnSpPr>
+                <a:stCxn id="51" idx="0"/>
+                <a:endCxn id="24" idx="2"/>
+              </p:cNvCxnSpPr>
+              <p:nvPr/>
+            </p:nvCxnSpPr>
+            <p:spPr>
+              <a:xfrm flipV="1">
+                <a:off x="7138521" y="3818298"/>
+                <a:ext cx="744034" cy="342707"/>
+              </a:xfrm>
+              <a:prstGeom prst="straightConnector1">
+                <a:avLst/>
+              </a:prstGeom>
+              <a:ln>
+                <a:tailEnd type="triangle"/>
+              </a:ln>
+            </p:spPr>
+            <p:style>
+              <a:lnRef idx="1">
+                <a:schemeClr val="accent1"/>
+              </a:lnRef>
+              <a:fillRef idx="0">
+                <a:schemeClr val="accent1"/>
+              </a:fillRef>
+              <a:effectRef idx="0">
+                <a:schemeClr val="accent1"/>
+              </a:effectRef>
+              <a:fontRef idx="minor">
+                <a:schemeClr val="tx1"/>
+              </a:fontRef>
+            </p:style>
+          </p:cxnSp>
+          <p:sp>
+            <p:nvSpPr>
+              <p:cNvPr id="58" name="TextBox 57"/>
+              <p:cNvSpPr txBox="1"/>
+              <p:nvPr/>
+            </p:nvSpPr>
+            <p:spPr>
+              <a:xfrm>
+                <a:off x="8316173" y="4137499"/>
+                <a:ext cx="1086415" cy="584775"/>
+              </a:xfrm>
+              <a:prstGeom prst="rect">
+                <a:avLst/>
+              </a:prstGeom>
+              <a:noFill/>
+            </p:spPr>
+            <p:txBody>
+              <a:bodyPr wrap="square" rtlCol="0">
+                <a:spAutoFit/>
+              </a:bodyPr>
+              <a:lstStyle/>
+              <a:p>
+                <a:r>
+                  <a:rPr lang="en-US" sz="1600" dirty="0" smtClean="0"/>
+                  <a:t>Command FLITs</a:t>
+                </a:r>
+                <a:endParaRPr lang="ru-RU" sz="1600" dirty="0"/>
+              </a:p>
+            </p:txBody>
+          </p:sp>
+          <p:cxnSp>
+            <p:nvCxnSpPr>
+              <p:cNvPr id="59" name="Straight Arrow Connector 58"/>
+              <p:cNvCxnSpPr>
+                <a:stCxn id="58" idx="0"/>
+                <a:endCxn id="36" idx="2"/>
+              </p:cNvCxnSpPr>
+              <p:nvPr/>
+            </p:nvCxnSpPr>
+            <p:spPr>
+              <a:xfrm flipV="1">
+                <a:off x="8859381" y="3816039"/>
+                <a:ext cx="520023" cy="321460"/>
+              </a:xfrm>
+              <a:prstGeom prst="straightConnector1">
+                <a:avLst/>
+              </a:prstGeom>
+              <a:ln>
+                <a:tailEnd type="triangle"/>
+              </a:ln>
+            </p:spPr>
+            <p:style>
+              <a:lnRef idx="1">
+                <a:schemeClr val="accent1"/>
+              </a:lnRef>
+              <a:fillRef idx="0">
+                <a:schemeClr val="accent1"/>
+              </a:fillRef>
+              <a:effectRef idx="0">
+                <a:schemeClr val="accent1"/>
+              </a:effectRef>
+              <a:fontRef idx="minor">
+                <a:schemeClr val="tx1"/>
+              </a:fontRef>
+            </p:style>
+          </p:cxnSp>
+        </p:grpSp>
+      </p:grpSp>
+    </p:spTree>
+    <p:extLst>
+      <p:ext uri="{BB962C8B-B14F-4D97-AF65-F5344CB8AC3E}">
+        <p14:creationId xmlns:p14="http://schemas.microsoft.com/office/powerpoint/2010/main" val="1931823947"/>
+      </p:ext>
+    </p:extLst>
+  </p:cSld>
+  <p:clrMapOvr>
+    <a:masterClrMapping/>
+  </p:clrMapOvr>
+</p:sld>
+</file>
+
 <file path=ppt/theme/theme1.xml><?xml version="1.0" encoding="utf-8"?>
 <a:theme xmlns:a="http://schemas.openxmlformats.org/drawingml/2006/main" name="Office Theme">
   <a:themeElements>

</xml_diff>